<commit_message>
Add the outlines of other java files
</commit_message>
<xml_diff>
--- a/Android/AppControl.pptx
+++ b/Android/AppControl.pptx
@@ -15,6 +15,12 @@
     <p:sldId id="263" r:id="rId9"/>
     <p:sldId id="264" r:id="rId10"/>
     <p:sldId id="265" r:id="rId11"/>
+    <p:sldId id="266" r:id="rId12"/>
+    <p:sldId id="267" r:id="rId13"/>
+    <p:sldId id="268" r:id="rId14"/>
+    <p:sldId id="269" r:id="rId15"/>
+    <p:sldId id="270" r:id="rId16"/>
+    <p:sldId id="271" r:id="rId17"/>
   </p:sldIdLst>
   <p:sldSz cx="9144000" cy="6858000" type="screen4x3"/>
   <p:notesSz cx="6858000" cy="9144000"/>
@@ -297,6 +303,7 @@
           <a:p>
             <a:fld id="{67F1765A-5B28-4144-8419-FB1843E08DA0}" type="datetimeFigureOut">
               <a:rPr lang="ko-KR" altLang="en-US" smtClean="0"/>
+              <a:pPr/>
               <a:t>2016-12-16</a:t>
             </a:fld>
             <a:endParaRPr lang="ko-KR" altLang="en-US"/>
@@ -339,6 +346,7 @@
           <a:p>
             <a:fld id="{1B5FF767-575A-4C06-BEEF-1B655F901806}" type="slidenum">
               <a:rPr lang="ko-KR" altLang="en-US" smtClean="0"/>
+              <a:pPr/>
               <a:t>‹#›</a:t>
             </a:fld>
             <a:endParaRPr lang="ko-KR" altLang="en-US"/>
@@ -462,6 +470,7 @@
           <a:p>
             <a:fld id="{67F1765A-5B28-4144-8419-FB1843E08DA0}" type="datetimeFigureOut">
               <a:rPr lang="ko-KR" altLang="en-US" smtClean="0"/>
+              <a:pPr/>
               <a:t>2016-12-16</a:t>
             </a:fld>
             <a:endParaRPr lang="ko-KR" altLang="en-US"/>
@@ -504,6 +513,7 @@
           <a:p>
             <a:fld id="{1B5FF767-575A-4C06-BEEF-1B655F901806}" type="slidenum">
               <a:rPr lang="ko-KR" altLang="en-US" smtClean="0"/>
+              <a:pPr/>
               <a:t>‹#›</a:t>
             </a:fld>
             <a:endParaRPr lang="ko-KR" altLang="en-US"/>
@@ -637,6 +647,7 @@
           <a:p>
             <a:fld id="{67F1765A-5B28-4144-8419-FB1843E08DA0}" type="datetimeFigureOut">
               <a:rPr lang="ko-KR" altLang="en-US" smtClean="0"/>
+              <a:pPr/>
               <a:t>2016-12-16</a:t>
             </a:fld>
             <a:endParaRPr lang="ko-KR" altLang="en-US"/>
@@ -679,6 +690,7 @@
           <a:p>
             <a:fld id="{1B5FF767-575A-4C06-BEEF-1B655F901806}" type="slidenum">
               <a:rPr lang="ko-KR" altLang="en-US" smtClean="0"/>
+              <a:pPr/>
               <a:t>‹#›</a:t>
             </a:fld>
             <a:endParaRPr lang="ko-KR" altLang="en-US"/>
@@ -802,6 +814,7 @@
           <a:p>
             <a:fld id="{67F1765A-5B28-4144-8419-FB1843E08DA0}" type="datetimeFigureOut">
               <a:rPr lang="ko-KR" altLang="en-US" smtClean="0"/>
+              <a:pPr/>
               <a:t>2016-12-16</a:t>
             </a:fld>
             <a:endParaRPr lang="ko-KR" altLang="en-US"/>
@@ -844,6 +857,7 @@
           <a:p>
             <a:fld id="{1B5FF767-575A-4C06-BEEF-1B655F901806}" type="slidenum">
               <a:rPr lang="ko-KR" altLang="en-US" smtClean="0"/>
+              <a:pPr/>
               <a:t>‹#›</a:t>
             </a:fld>
             <a:endParaRPr lang="ko-KR" altLang="en-US"/>
@@ -1043,6 +1057,7 @@
           <a:p>
             <a:fld id="{67F1765A-5B28-4144-8419-FB1843E08DA0}" type="datetimeFigureOut">
               <a:rPr lang="ko-KR" altLang="en-US" smtClean="0"/>
+              <a:pPr/>
               <a:t>2016-12-16</a:t>
             </a:fld>
             <a:endParaRPr lang="ko-KR" altLang="en-US"/>
@@ -1085,6 +1100,7 @@
           <a:p>
             <a:fld id="{1B5FF767-575A-4C06-BEEF-1B655F901806}" type="slidenum">
               <a:rPr lang="ko-KR" altLang="en-US" smtClean="0"/>
+              <a:pPr/>
               <a:t>‹#›</a:t>
             </a:fld>
             <a:endParaRPr lang="ko-KR" altLang="en-US"/>
@@ -1326,6 +1342,7 @@
           <a:p>
             <a:fld id="{67F1765A-5B28-4144-8419-FB1843E08DA0}" type="datetimeFigureOut">
               <a:rPr lang="ko-KR" altLang="en-US" smtClean="0"/>
+              <a:pPr/>
               <a:t>2016-12-16</a:t>
             </a:fld>
             <a:endParaRPr lang="ko-KR" altLang="en-US"/>
@@ -1368,6 +1385,7 @@
           <a:p>
             <a:fld id="{1B5FF767-575A-4C06-BEEF-1B655F901806}" type="slidenum">
               <a:rPr lang="ko-KR" altLang="en-US" smtClean="0"/>
+              <a:pPr/>
               <a:t>‹#›</a:t>
             </a:fld>
             <a:endParaRPr lang="ko-KR" altLang="en-US"/>
@@ -1743,6 +1761,7 @@
           <a:p>
             <a:fld id="{67F1765A-5B28-4144-8419-FB1843E08DA0}" type="datetimeFigureOut">
               <a:rPr lang="ko-KR" altLang="en-US" smtClean="0"/>
+              <a:pPr/>
               <a:t>2016-12-16</a:t>
             </a:fld>
             <a:endParaRPr lang="ko-KR" altLang="en-US"/>
@@ -1785,6 +1804,7 @@
           <a:p>
             <a:fld id="{1B5FF767-575A-4C06-BEEF-1B655F901806}" type="slidenum">
               <a:rPr lang="ko-KR" altLang="en-US" smtClean="0"/>
+              <a:pPr/>
               <a:t>‹#›</a:t>
             </a:fld>
             <a:endParaRPr lang="ko-KR" altLang="en-US"/>
@@ -1856,6 +1876,7 @@
           <a:p>
             <a:fld id="{67F1765A-5B28-4144-8419-FB1843E08DA0}" type="datetimeFigureOut">
               <a:rPr lang="ko-KR" altLang="en-US" smtClean="0"/>
+              <a:pPr/>
               <a:t>2016-12-16</a:t>
             </a:fld>
             <a:endParaRPr lang="ko-KR" altLang="en-US"/>
@@ -1898,6 +1919,7 @@
           <a:p>
             <a:fld id="{1B5FF767-575A-4C06-BEEF-1B655F901806}" type="slidenum">
               <a:rPr lang="ko-KR" altLang="en-US" smtClean="0"/>
+              <a:pPr/>
               <a:t>‹#›</a:t>
             </a:fld>
             <a:endParaRPr lang="ko-KR" altLang="en-US"/>
@@ -1946,6 +1968,7 @@
           <a:p>
             <a:fld id="{67F1765A-5B28-4144-8419-FB1843E08DA0}" type="datetimeFigureOut">
               <a:rPr lang="ko-KR" altLang="en-US" smtClean="0"/>
+              <a:pPr/>
               <a:t>2016-12-16</a:t>
             </a:fld>
             <a:endParaRPr lang="ko-KR" altLang="en-US"/>
@@ -1988,6 +2011,7 @@
           <a:p>
             <a:fld id="{1B5FF767-575A-4C06-BEEF-1B655F901806}" type="slidenum">
               <a:rPr lang="ko-KR" altLang="en-US" smtClean="0"/>
+              <a:pPr/>
               <a:t>‹#›</a:t>
             </a:fld>
             <a:endParaRPr lang="ko-KR" altLang="en-US"/>
@@ -2218,6 +2242,7 @@
           <a:p>
             <a:fld id="{67F1765A-5B28-4144-8419-FB1843E08DA0}" type="datetimeFigureOut">
               <a:rPr lang="ko-KR" altLang="en-US" smtClean="0"/>
+              <a:pPr/>
               <a:t>2016-12-16</a:t>
             </a:fld>
             <a:endParaRPr lang="ko-KR" altLang="en-US"/>
@@ -2260,6 +2285,7 @@
           <a:p>
             <a:fld id="{1B5FF767-575A-4C06-BEEF-1B655F901806}" type="slidenum">
               <a:rPr lang="ko-KR" altLang="en-US" smtClean="0"/>
+              <a:pPr/>
               <a:t>‹#›</a:t>
             </a:fld>
             <a:endParaRPr lang="ko-KR" altLang="en-US"/>
@@ -2466,6 +2492,7 @@
           <a:p>
             <a:fld id="{67F1765A-5B28-4144-8419-FB1843E08DA0}" type="datetimeFigureOut">
               <a:rPr lang="ko-KR" altLang="en-US" smtClean="0"/>
+              <a:pPr/>
               <a:t>2016-12-16</a:t>
             </a:fld>
             <a:endParaRPr lang="ko-KR" altLang="en-US"/>
@@ -2508,6 +2535,7 @@
           <a:p>
             <a:fld id="{1B5FF767-575A-4C06-BEEF-1B655F901806}" type="slidenum">
               <a:rPr lang="ko-KR" altLang="en-US" smtClean="0"/>
+              <a:pPr/>
               <a:t>‹#›</a:t>
             </a:fld>
             <a:endParaRPr lang="ko-KR" altLang="en-US"/>
@@ -2674,6 +2702,7 @@
           <a:p>
             <a:fld id="{67F1765A-5B28-4144-8419-FB1843E08DA0}" type="datetimeFigureOut">
               <a:rPr lang="ko-KR" altLang="en-US" smtClean="0"/>
+              <a:pPr/>
               <a:t>2016-12-16</a:t>
             </a:fld>
             <a:endParaRPr lang="ko-KR" altLang="en-US"/>
@@ -2752,6 +2781,7 @@
           <a:p>
             <a:fld id="{1B5FF767-575A-4C06-BEEF-1B655F901806}" type="slidenum">
               <a:rPr lang="ko-KR" altLang="en-US" smtClean="0"/>
+              <a:pPr/>
               <a:t>‹#›</a:t>
             </a:fld>
             <a:endParaRPr lang="ko-KR" altLang="en-US"/>
@@ -3091,12 +3121,27 @@
   <p:clrMapOvr>
     <a:masterClrMapping/>
   </p:clrMapOvr>
+  <p:timing>
+    <p:tnLst>
+      <p:par>
+        <p:cTn id="1" dur="indefinite" restart="never" nodeType="tmRoot"/>
+      </p:par>
+    </p:tnLst>
+  </p:timing>
 </p:sld>
 </file>
 
 <file path=ppt/slides/slide10.xml><?xml version="1.0" encoding="utf-8"?>
 <p:sld xmlns:a="http://schemas.openxmlformats.org/drawingml/2006/main" xmlns:r="http://schemas.openxmlformats.org/officeDocument/2006/relationships" xmlns:p="http://schemas.openxmlformats.org/presentationml/2006/main">
   <p:cSld>
+    <p:bg>
+      <p:bgPr>
+        <a:solidFill>
+          <a:schemeClr val="accent3"/>
+        </a:solidFill>
+        <a:effectLst/>
+      </p:bgPr>
+    </p:bg>
     <p:spTree>
       <p:nvGrpSpPr>
         <p:cNvPr id="1" name=""/>
@@ -3190,8 +3235,16 @@
             </a:r>
             <a:r>
               <a:rPr lang="en-US" altLang="ko-KR" dirty="0" smtClean="0"/>
-              <a:t>( )</a:t>
-            </a:r>
+              <a:t>( </a:t>
+            </a:r>
+            <a:r>
+              <a:rPr lang="en-US" altLang="ko-KR" dirty="0" smtClean="0"/>
+              <a:t>)</a:t>
+            </a:r>
+          </a:p>
+          <a:p>
+            <a:pPr lvl="1"/>
+            <a:endParaRPr lang="en-US" altLang="ko-KR" dirty="0" smtClean="0"/>
           </a:p>
           <a:p>
             <a:r>
@@ -3199,7 +3252,7 @@
               <a:t>elMgr.activateLicense</a:t>
             </a:r>
             <a:r>
-              <a:rPr lang="en-US" altLang="ko-KR" smtClean="0"/>
+              <a:rPr lang="en-US" altLang="ko-KR" dirty="0" smtClean="0"/>
               <a:t>( key ) </a:t>
             </a:r>
           </a:p>
@@ -3214,12 +3267,30 @@
   <p:clrMapOvr>
     <a:masterClrMapping/>
   </p:clrMapOvr>
+  <p:timing>
+    <p:tnLst>
+      <p:par>
+        <p:cTn id="1" dur="indefinite" restart="never" nodeType="tmRoot"/>
+      </p:par>
+    </p:tnLst>
+  </p:timing>
 </p:sld>
 </file>
 
-<file path=ppt/slides/slide2.xml><?xml version="1.0" encoding="utf-8"?>
+<file path=ppt/slides/slide11.xml><?xml version="1.0" encoding="utf-8"?>
 <p:sld xmlns:a="http://schemas.openxmlformats.org/drawingml/2006/main" xmlns:r="http://schemas.openxmlformats.org/officeDocument/2006/relationships" xmlns:p="http://schemas.openxmlformats.org/presentationml/2006/main">
   <p:cSld>
+    <p:bg>
+      <p:bgPr>
+        <a:solidFill>
+          <a:schemeClr val="tx2">
+            <a:lumMod val="20000"/>
+            <a:lumOff val="80000"/>
+          </a:schemeClr>
+        </a:solidFill>
+        <a:effectLst/>
+      </p:bgPr>
+    </p:bg>
     <p:spTree>
       <p:nvGrpSpPr>
         <p:cNvPr id="1" name=""/>
@@ -3251,7 +3322,7 @@
           <a:p>
             <a:r>
               <a:rPr lang="en-US" altLang="ko-KR" dirty="0" smtClean="0"/>
-              <a:t>AdminLicenseActivation.java</a:t>
+              <a:t>LicenseReceiver.java</a:t>
             </a:r>
             <a:endParaRPr lang="ko-KR" altLang="en-US" dirty="0"/>
           </a:p>
@@ -3274,31 +3345,30 @@
           <a:p>
             <a:r>
               <a:rPr lang="en-US" altLang="ko-KR" dirty="0" smtClean="0"/>
-              <a:t>Launcher activity of the app</a:t>
-            </a:r>
-          </a:p>
-          <a:p>
-            <a:endParaRPr lang="en-US" altLang="ko-KR" dirty="0"/>
-          </a:p>
-          <a:p>
-            <a:r>
-              <a:rPr lang="en-US" altLang="ko-KR" dirty="0" smtClean="0"/>
-              <a:t>Helps in </a:t>
-            </a:r>
-            <a:r>
-              <a:rPr lang="en-US" altLang="ko-KR" dirty="0" err="1" smtClean="0"/>
-              <a:t>eabling</a:t>
-            </a:r>
-            <a:r>
-              <a:rPr lang="en-US" altLang="ko-KR" dirty="0" smtClean="0"/>
-              <a:t> admin and activating ELM</a:t>
-            </a:r>
-          </a:p>
-          <a:p>
-            <a:endParaRPr lang="en-US" altLang="ko-KR" dirty="0"/>
-          </a:p>
-          <a:p>
-            <a:endParaRPr lang="ko-KR" altLang="en-US" dirty="0"/>
+              <a:t>extends </a:t>
+            </a:r>
+            <a:r>
+              <a:rPr lang="en-US" altLang="ko-KR" dirty="0" err="1" smtClean="0"/>
+              <a:t>BroadcastReceiver</a:t>
+            </a:r>
+            <a:endParaRPr lang="en-US" altLang="ko-KR" dirty="0" smtClean="0"/>
+          </a:p>
+          <a:p>
+            <a:endParaRPr lang="en-US" altLang="ko-KR" dirty="0" smtClean="0"/>
+          </a:p>
+          <a:p>
+            <a:r>
+              <a:rPr lang="en-US" altLang="ko-KR" dirty="0" smtClean="0"/>
+              <a:t>handles ELM activation result</a:t>
+            </a:r>
+          </a:p>
+          <a:p>
+            <a:pPr lvl="1"/>
+            <a:r>
+              <a:rPr lang="en-US" altLang="ko-KR" dirty="0" smtClean="0"/>
+              <a:t>if ELM activated, it sends RESULT_ELM_ACTIVATED.</a:t>
+            </a:r>
+            <a:endParaRPr lang="en-US" altLang="ko-KR" dirty="0" smtClean="0"/>
           </a:p>
         </p:txBody>
       </p:sp>
@@ -3307,12 +3377,30 @@
   <p:clrMapOvr>
     <a:masterClrMapping/>
   </p:clrMapOvr>
+  <p:timing>
+    <p:tnLst>
+      <p:par>
+        <p:cTn id="1" dur="indefinite" restart="never" nodeType="tmRoot"/>
+      </p:par>
+    </p:tnLst>
+  </p:timing>
 </p:sld>
 </file>
 
-<file path=ppt/slides/slide3.xml><?xml version="1.0" encoding="utf-8"?>
+<file path=ppt/slides/slide12.xml><?xml version="1.0" encoding="utf-8"?>
 <p:sld xmlns:a="http://schemas.openxmlformats.org/drawingml/2006/main" xmlns:r="http://schemas.openxmlformats.org/officeDocument/2006/relationships" xmlns:p="http://schemas.openxmlformats.org/presentationml/2006/main">
   <p:cSld>
+    <p:bg>
+      <p:bgPr>
+        <a:solidFill>
+          <a:schemeClr val="tx2">
+            <a:lumMod val="20000"/>
+            <a:lumOff val="80000"/>
+          </a:schemeClr>
+        </a:solidFill>
+        <a:effectLst/>
+      </p:bgPr>
+    </p:bg>
     <p:spTree>
       <p:nvGrpSpPr>
         <p:cNvPr id="1" name=""/>
@@ -3339,18 +3427,12 @@
         </p:nvSpPr>
         <p:spPr/>
         <p:txBody>
-          <a:bodyPr>
-            <a:normAutofit fontScale="90000"/>
-          </a:bodyPr>
-          <a:lstStyle/>
-          <a:p>
-            <a:r>
-              <a:rPr lang="en-US" altLang="ko-KR" dirty="0" err="1" smtClean="0"/>
-              <a:t>AdminLicenseActivation</a:t>
-            </a:r>
-            <a:r>
-              <a:rPr lang="en-US" altLang="ko-KR" dirty="0" smtClean="0"/>
-              <a:t> Properties</a:t>
+          <a:bodyPr/>
+          <a:lstStyle/>
+          <a:p>
+            <a:r>
+              <a:rPr lang="en-US" altLang="ko-KR" dirty="0" smtClean="0"/>
+              <a:t>DeviceAdministrator.java</a:t>
             </a:r>
             <a:endParaRPr lang="ko-KR" altLang="en-US" dirty="0"/>
           </a:p>
@@ -3372,72 +3454,64 @@
           <a:lstStyle/>
           <a:p>
             <a:r>
-              <a:rPr lang="en-US" altLang="ko-KR" dirty="0" err="1" smtClean="0"/>
-              <a:t>DevicePolicyManage</a:t>
-            </a:r>
-            <a:r>
-              <a:rPr lang="en-US" altLang="ko-KR" dirty="0" smtClean="0"/>
-              <a:t> _</a:t>
-            </a:r>
-            <a:r>
-              <a:rPr lang="en-US" altLang="ko-KR" dirty="0" err="1" smtClean="0"/>
-              <a:t>dpm</a:t>
+              <a:rPr lang="en-US" altLang="ko-KR" dirty="0" smtClean="0"/>
+              <a:t>extends </a:t>
+            </a:r>
+            <a:r>
+              <a:rPr lang="en-US" altLang="ko-KR" dirty="0" err="1" smtClean="0"/>
+              <a:t>DeviceAdminReceiver</a:t>
             </a:r>
             <a:endParaRPr lang="en-US" altLang="ko-KR" dirty="0" smtClean="0"/>
           </a:p>
           <a:p>
-            <a:endParaRPr lang="en-US" altLang="ko-KR" dirty="0"/>
-          </a:p>
-          <a:p>
-            <a:r>
-              <a:rPr lang="en-US" altLang="ko-KR" dirty="0" err="1" smtClean="0"/>
-              <a:t>ComponentName</a:t>
-            </a:r>
-            <a:r>
-              <a:rPr lang="en-US" altLang="ko-KR" dirty="0" smtClean="0"/>
-              <a:t> _</a:t>
-            </a:r>
-            <a:r>
-              <a:rPr lang="en-US" altLang="ko-KR" dirty="0" err="1" smtClean="0"/>
-              <a:t>cn</a:t>
-            </a:r>
             <a:endParaRPr lang="en-US" altLang="ko-KR" dirty="0" smtClean="0"/>
           </a:p>
           <a:p>
-            <a:endParaRPr lang="en-US" altLang="ko-KR" dirty="0"/>
-          </a:p>
-          <a:p>
-            <a:r>
-              <a:rPr lang="en-US" altLang="ko-KR" dirty="0" err="1" smtClean="0"/>
-              <a:t>LicenseReceiver</a:t>
-            </a:r>
-            <a:r>
-              <a:rPr lang="en-US" altLang="ko-KR" dirty="0" smtClean="0"/>
-              <a:t> _</a:t>
-            </a:r>
-            <a:r>
-              <a:rPr lang="en-US" altLang="ko-KR" dirty="0" err="1" smtClean="0"/>
-              <a:t>lr</a:t>
-            </a:r>
+            <a:r>
+              <a:rPr lang="en-US" altLang="ko-KR" dirty="0" err="1" smtClean="0"/>
+              <a:t>onEnabled</a:t>
+            </a:r>
+            <a:r>
+              <a:rPr lang="en-US" altLang="ko-KR" dirty="0" smtClean="0"/>
+              <a:t>( ) / </a:t>
+            </a:r>
+            <a:r>
+              <a:rPr lang="en-US" altLang="ko-KR" dirty="0" err="1" smtClean="0"/>
+              <a:t>onDisabled</a:t>
+            </a:r>
+            <a:r>
+              <a:rPr lang="en-US" altLang="ko-KR" dirty="0" smtClean="0"/>
+              <a:t>( )</a:t>
+            </a:r>
+          </a:p>
+          <a:p>
+            <a:pPr lvl="1"/>
+            <a:r>
+              <a:rPr lang="en-US" altLang="ko-KR" dirty="0" smtClean="0"/>
+              <a:t> </a:t>
+            </a:r>
+            <a:r>
+              <a:rPr lang="en-US" altLang="ko-KR" dirty="0" smtClean="0"/>
+              <a:t>sends ADMIN_ENALBED / ADMIN_DISABLED</a:t>
+            </a:r>
+          </a:p>
+          <a:p>
+            <a:pPr lvl="1"/>
             <a:endParaRPr lang="en-US" altLang="ko-KR" dirty="0" smtClean="0"/>
           </a:p>
           <a:p>
-            <a:endParaRPr lang="en-US" altLang="ko-KR" dirty="0"/>
-          </a:p>
-          <a:p>
-            <a:r>
-              <a:rPr lang="en-US" altLang="ko-KR" dirty="0" err="1" smtClean="0"/>
-              <a:t>DeviceAdministrator</a:t>
-            </a:r>
-            <a:r>
-              <a:rPr lang="en-US" altLang="ko-KR" dirty="0" smtClean="0"/>
-              <a:t> _</a:t>
-            </a:r>
-            <a:r>
-              <a:rPr lang="en-US" altLang="ko-KR" dirty="0" err="1" smtClean="0"/>
-              <a:t>da</a:t>
-            </a:r>
+            <a:pPr lvl="1"/>
             <a:endParaRPr lang="en-US" altLang="ko-KR" dirty="0" smtClean="0"/>
+          </a:p>
+          <a:p>
+            <a:pPr lvl="1"/>
+            <a:endParaRPr lang="en-US" altLang="ko-KR" dirty="0" smtClean="0"/>
+          </a:p>
+          <a:p>
+            <a:endParaRPr lang="en-US" altLang="ko-KR" dirty="0" smtClean="0"/>
+          </a:p>
+          <a:p>
+            <a:endParaRPr lang="ko-KR" altLang="en-US" dirty="0"/>
           </a:p>
         </p:txBody>
       </p:sp>
@@ -3446,12 +3520,30 @@
   <p:clrMapOvr>
     <a:masterClrMapping/>
   </p:clrMapOvr>
+  <p:timing>
+    <p:tnLst>
+      <p:par>
+        <p:cTn id="1" dur="indefinite" restart="never" nodeType="tmRoot"/>
+      </p:par>
+    </p:tnLst>
+  </p:timing>
 </p:sld>
 </file>
 
-<file path=ppt/slides/slide4.xml><?xml version="1.0" encoding="utf-8"?>
+<file path=ppt/slides/slide13.xml><?xml version="1.0" encoding="utf-8"?>
 <p:sld xmlns:a="http://schemas.openxmlformats.org/drawingml/2006/main" xmlns:r="http://schemas.openxmlformats.org/officeDocument/2006/relationships" xmlns:p="http://schemas.openxmlformats.org/presentationml/2006/main">
   <p:cSld>
+    <p:bg>
+      <p:bgPr>
+        <a:solidFill>
+          <a:schemeClr val="tx2">
+            <a:lumMod val="20000"/>
+            <a:lumOff val="80000"/>
+          </a:schemeClr>
+        </a:solidFill>
+        <a:effectLst/>
+      </p:bgPr>
+    </p:bg>
     <p:spTree>
       <p:nvGrpSpPr>
         <p:cNvPr id="1" name=""/>
@@ -3483,7 +3575,7 @@
           <a:p>
             <a:r>
               <a:rPr lang="en-US" altLang="ko-KR" dirty="0" smtClean="0"/>
-              <a:t>Declaring Handler</a:t>
+              <a:t>SAApplication.java</a:t>
             </a:r>
             <a:endParaRPr lang="ko-KR" altLang="en-US" dirty="0"/>
           </a:p>
@@ -3506,20 +3598,13 @@
           <a:p>
             <a:r>
               <a:rPr lang="en-US" altLang="ko-KR" dirty="0" smtClean="0"/>
-              <a:t>handles messages from </a:t>
-            </a:r>
-            <a:r>
-              <a:rPr lang="en-US" altLang="ko-KR" dirty="0" err="1" smtClean="0"/>
-              <a:t>DeviceAdminstrator</a:t>
-            </a:r>
-            <a:r>
-              <a:rPr lang="en-US" altLang="ko-KR" dirty="0" smtClean="0"/>
-              <a:t> and </a:t>
-            </a:r>
-            <a:r>
-              <a:rPr lang="en-US" altLang="ko-KR" dirty="0" err="1" smtClean="0"/>
-              <a:t>LicenseReceiver</a:t>
-            </a:r>
+              <a:t>extends Application.</a:t>
+            </a:r>
+          </a:p>
+          <a:p>
+            <a:endParaRPr lang="en-US" altLang="ko-KR" dirty="0" smtClean="0"/>
+          </a:p>
+          <a:p>
             <a:endParaRPr lang="ko-KR" altLang="en-US" dirty="0"/>
           </a:p>
         </p:txBody>
@@ -3529,12 +3614,30 @@
   <p:clrMapOvr>
     <a:masterClrMapping/>
   </p:clrMapOvr>
+  <p:timing>
+    <p:tnLst>
+      <p:par>
+        <p:cTn id="1" dur="indefinite" restart="never" nodeType="tmRoot"/>
+      </p:par>
+    </p:tnLst>
+  </p:timing>
 </p:sld>
 </file>
 
-<file path=ppt/slides/slide5.xml><?xml version="1.0" encoding="utf-8"?>
+<file path=ppt/slides/slide14.xml><?xml version="1.0" encoding="utf-8"?>
 <p:sld xmlns:a="http://schemas.openxmlformats.org/drawingml/2006/main" xmlns:r="http://schemas.openxmlformats.org/officeDocument/2006/relationships" xmlns:p="http://schemas.openxmlformats.org/presentationml/2006/main">
   <p:cSld>
+    <p:bg>
+      <p:bgPr>
+        <a:solidFill>
+          <a:schemeClr val="tx2">
+            <a:lumMod val="20000"/>
+            <a:lumOff val="80000"/>
+          </a:schemeClr>
+        </a:solidFill>
+        <a:effectLst/>
+      </p:bgPr>
+    </p:bg>
     <p:spTree>
       <p:nvGrpSpPr>
         <p:cNvPr id="1" name=""/>
@@ -3565,12 +3668,8 @@
           <a:lstStyle/>
           <a:p>
             <a:r>
-              <a:rPr lang="en-US" altLang="ko-KR" dirty="0" err="1" smtClean="0"/>
-              <a:t>onCreate</a:t>
-            </a:r>
-            <a:r>
-              <a:rPr lang="en-US" altLang="ko-KR" dirty="0" smtClean="0"/>
-              <a:t>( )</a:t>
+              <a:rPr lang="en-US" altLang="ko-KR" dirty="0" smtClean="0"/>
+              <a:t>MainActivity.java</a:t>
             </a:r>
             <a:endParaRPr lang="ko-KR" altLang="en-US" dirty="0"/>
           </a:p>
@@ -3593,48 +3692,80 @@
           <a:p>
             <a:r>
               <a:rPr lang="en-US" altLang="ko-KR" dirty="0" smtClean="0"/>
-              <a:t>_</a:t>
-            </a:r>
-            <a:r>
-              <a:rPr lang="en-US" altLang="ko-KR" dirty="0" err="1" smtClean="0"/>
-              <a:t>lr</a:t>
-            </a:r>
-            <a:r>
-              <a:rPr lang="en-US" altLang="ko-KR" dirty="0" smtClean="0"/>
-              <a:t> = new </a:t>
-            </a:r>
-            <a:r>
-              <a:rPr lang="en-US" altLang="ko-KR" dirty="0" err="1" smtClean="0"/>
-              <a:t>LicenseReceiver</a:t>
-            </a:r>
-            <a:r>
-              <a:rPr lang="en-US" altLang="ko-KR" dirty="0" smtClean="0"/>
-              <a:t>(_handler) </a:t>
-            </a:r>
-            <a:endParaRPr lang="en-US" altLang="ko-KR" dirty="0"/>
-          </a:p>
-          <a:p>
-            <a:r>
-              <a:rPr lang="en-US" altLang="ko-KR" dirty="0" smtClean="0"/>
-              <a:t>_</a:t>
-            </a:r>
-            <a:r>
-              <a:rPr lang="en-US" altLang="ko-KR" dirty="0" err="1" smtClean="0"/>
-              <a:t>da</a:t>
-            </a:r>
-            <a:r>
-              <a:rPr lang="en-US" altLang="ko-KR" dirty="0" smtClean="0"/>
-              <a:t> = new </a:t>
-            </a:r>
-            <a:r>
-              <a:rPr lang="en-US" altLang="ko-KR" dirty="0" err="1" smtClean="0"/>
-              <a:t>DeviceAdministrator</a:t>
-            </a:r>
-            <a:r>
-              <a:rPr lang="en-US" altLang="ko-KR" dirty="0" smtClean="0"/>
-              <a:t>(_handler)</a:t>
-            </a:r>
-            <a:endParaRPr lang="ko-KR" altLang="en-US" dirty="0"/>
+              <a:t>extends Activity.</a:t>
+            </a:r>
+          </a:p>
+          <a:p>
+            <a:endParaRPr lang="en-US" altLang="ko-KR" dirty="0" smtClean="0"/>
+          </a:p>
+          <a:p>
+            <a:r>
+              <a:rPr lang="en-US" altLang="ko-KR" dirty="0" err="1" smtClean="0"/>
+              <a:t>EnterpriseDeviceManager</a:t>
+            </a:r>
+            <a:r>
+              <a:rPr lang="en-US" altLang="ko-KR" dirty="0" smtClean="0"/>
+              <a:t> </a:t>
+            </a:r>
+            <a:r>
+              <a:rPr lang="en-US" altLang="ko-KR" dirty="0" err="1" smtClean="0"/>
+              <a:t>edm</a:t>
+            </a:r>
+            <a:r>
+              <a:rPr lang="en-US" altLang="ko-KR" dirty="0" smtClean="0"/>
+              <a:t> </a:t>
+            </a:r>
+            <a:r>
+              <a:rPr lang="en-US" altLang="ko-KR" dirty="0" smtClean="0"/>
+              <a:t>= (</a:t>
+            </a:r>
+            <a:r>
+              <a:rPr lang="en-US" altLang="ko-KR" dirty="0" err="1" smtClean="0"/>
+              <a:t>EnterpriseDeviceManager</a:t>
+            </a:r>
+            <a:r>
+              <a:rPr lang="en-US" altLang="ko-KR" dirty="0" smtClean="0"/>
+              <a:t>)</a:t>
+            </a:r>
+          </a:p>
+          <a:p>
+            <a:pPr>
+              <a:buNone/>
+            </a:pPr>
+            <a:r>
+              <a:rPr lang="en-US" altLang="ko-KR" dirty="0" err="1" smtClean="0"/>
+              <a:t>getSystemService</a:t>
+            </a:r>
+            <a:r>
+              <a:rPr lang="en-US" altLang="ko-KR" dirty="0" smtClean="0"/>
+              <a:t>(</a:t>
+            </a:r>
+          </a:p>
+          <a:p>
+            <a:pPr>
+              <a:buNone/>
+            </a:pPr>
+            <a:r>
+              <a:rPr lang="en-US" altLang="ko-KR" dirty="0" smtClean="0"/>
+              <a:t>	</a:t>
+            </a:r>
+            <a:r>
+              <a:rPr lang="en-US" altLang="ko-KR" dirty="0" err="1" smtClean="0"/>
+              <a:t>EnterpriseDeviceManager</a:t>
+            </a:r>
+            <a:r>
+              <a:rPr lang="en-US" altLang="ko-KR" dirty="0" smtClean="0"/>
+              <a:t>.</a:t>
+            </a:r>
+          </a:p>
+          <a:p>
+            <a:pPr>
+              <a:buNone/>
+            </a:pPr>
+            <a:r>
+              <a:rPr lang="en-US" altLang="ko-KR" dirty="0" smtClean="0"/>
+              <a:t>	ENTERPRISE_POLICY_SERVICE) </a:t>
+            </a:r>
           </a:p>
         </p:txBody>
       </p:sp>
@@ -3643,12 +3774,29 @@
   <p:clrMapOvr>
     <a:masterClrMapping/>
   </p:clrMapOvr>
+  <p:timing>
+    <p:tnLst>
+      <p:par>
+        <p:cTn id="1" dur="indefinite" restart="never" nodeType="tmRoot"/>
+      </p:par>
+    </p:tnLst>
+  </p:timing>
 </p:sld>
 </file>
 
-<file path=ppt/slides/slide6.xml><?xml version="1.0" encoding="utf-8"?>
+<file path=ppt/slides/slide15.xml><?xml version="1.0" encoding="utf-8"?>
 <p:sld xmlns:a="http://schemas.openxmlformats.org/drawingml/2006/main" xmlns:r="http://schemas.openxmlformats.org/officeDocument/2006/relationships" xmlns:p="http://schemas.openxmlformats.org/presentationml/2006/main">
   <p:cSld>
+    <p:bg>
+      <p:bgPr>
+        <a:solidFill>
+          <a:schemeClr val="bg1">
+            <a:lumMod val="85000"/>
+          </a:schemeClr>
+        </a:solidFill>
+        <a:effectLst/>
+      </p:bgPr>
+    </p:bg>
     <p:spTree>
       <p:nvGrpSpPr>
         <p:cNvPr id="1" name=""/>
@@ -3679,12 +3827,8 @@
           <a:lstStyle/>
           <a:p>
             <a:r>
-              <a:rPr lang="en-US" altLang="ko-KR" dirty="0" err="1" smtClean="0"/>
-              <a:t>onResume</a:t>
-            </a:r>
-            <a:r>
-              <a:rPr lang="en-US" altLang="ko-KR" dirty="0" smtClean="0"/>
-              <a:t>( )</a:t>
+              <a:rPr lang="en-US" altLang="ko-KR" dirty="0" smtClean="0"/>
+              <a:t>MainActivity.java 2</a:t>
             </a:r>
             <a:endParaRPr lang="ko-KR" altLang="en-US" dirty="0"/>
           </a:p>
@@ -3707,11 +3851,19 @@
           <a:p>
             <a:r>
               <a:rPr lang="en-US" altLang="ko-KR" dirty="0" err="1" smtClean="0"/>
-              <a:t>isActivityVisble</a:t>
-            </a:r>
-            <a:r>
-              <a:rPr lang="en-US" altLang="ko-KR" dirty="0" smtClean="0"/>
-              <a:t> = true </a:t>
+              <a:t>edm.getApplicationPolicy</a:t>
+            </a:r>
+            <a:r>
+              <a:rPr lang="en-US" altLang="ko-KR" dirty="0" smtClean="0"/>
+              <a:t>( ).</a:t>
+            </a:r>
+            <a:r>
+              <a:rPr lang="en-US" altLang="ko-KR" dirty="0" err="1" smtClean="0"/>
+              <a:t>enableAndroidBrowser</a:t>
+            </a:r>
+            <a:r>
+              <a:rPr lang="en-US" altLang="ko-KR" dirty="0" smtClean="0"/>
+              <a:t>( ) </a:t>
             </a:r>
           </a:p>
           <a:p>
@@ -3720,22 +3872,57 @@
           <a:p>
             <a:r>
               <a:rPr lang="en-US" altLang="ko-KR" dirty="0" err="1" smtClean="0"/>
-              <a:t>setUIStates</a:t>
-            </a:r>
-            <a:r>
-              <a:rPr lang="en-US" altLang="ko-KR" dirty="0" smtClean="0"/>
-              <a:t>(</a:t>
-            </a:r>
-            <a:r>
-              <a:rPr lang="en-US" altLang="ko-KR" dirty="0" err="1" smtClean="0"/>
-              <a:t>SAConstants.INITIAL_STATE</a:t>
-            </a:r>
-            <a:r>
-              <a:rPr lang="en-US" altLang="ko-KR" dirty="0" smtClean="0"/>
-              <a:t>)</a:t>
-            </a:r>
-          </a:p>
-          <a:p>
+              <a:t>edm.getApplicationPolicy</a:t>
+            </a:r>
+            <a:r>
+              <a:rPr lang="en-US" altLang="ko-KR" dirty="0" smtClean="0"/>
+              <a:t>( ).</a:t>
+            </a:r>
+            <a:r>
+              <a:rPr lang="en-US" altLang="ko-KR" dirty="0" err="1" smtClean="0"/>
+              <a:t>isApplicationInstalled</a:t>
+            </a:r>
+            <a:r>
+              <a:rPr lang="en-US" altLang="ko-KR" dirty="0" smtClean="0"/>
+              <a:t>( </a:t>
+            </a:r>
+            <a:r>
+              <a:rPr lang="en-US" altLang="ko-KR" dirty="0" err="1" smtClean="0"/>
+              <a:t>packageName</a:t>
+            </a:r>
+            <a:r>
+              <a:rPr lang="en-US" altLang="ko-KR" dirty="0" smtClean="0"/>
+              <a:t> )</a:t>
+            </a:r>
+          </a:p>
+          <a:p>
+            <a:endParaRPr lang="en-US" altLang="ko-KR" dirty="0" smtClean="0"/>
+          </a:p>
+          <a:p>
+            <a:r>
+              <a:rPr lang="en-US" altLang="ko-KR" dirty="0" err="1" smtClean="0"/>
+              <a:t>edm.getApplicationPolicy</a:t>
+            </a:r>
+            <a:r>
+              <a:rPr lang="en-US" altLang="ko-KR" dirty="0" smtClean="0"/>
+              <a:t>( ).</a:t>
+            </a:r>
+            <a:r>
+              <a:rPr lang="en-US" altLang="ko-KR" dirty="0" err="1" smtClean="0"/>
+              <a:t>setEnableApplication</a:t>
+            </a:r>
+            <a:r>
+              <a:rPr lang="en-US" altLang="ko-KR" dirty="0" smtClean="0"/>
+              <a:t>( </a:t>
+            </a:r>
+            <a:r>
+              <a:rPr lang="en-US" altLang="ko-KR" dirty="0" err="1" smtClean="0"/>
+              <a:t>packageName</a:t>
+            </a:r>
+            <a:r>
+              <a:rPr lang="en-US" altLang="ko-KR" dirty="0" smtClean="0"/>
+              <a:t> )</a:t>
+            </a:r>
             <a:endParaRPr lang="ko-KR" altLang="en-US" dirty="0"/>
           </a:p>
         </p:txBody>
@@ -3745,12 +3932,29 @@
   <p:clrMapOvr>
     <a:masterClrMapping/>
   </p:clrMapOvr>
+  <p:timing>
+    <p:tnLst>
+      <p:par>
+        <p:cTn id="1" dur="indefinite" restart="never" nodeType="tmRoot"/>
+      </p:par>
+    </p:tnLst>
+  </p:timing>
 </p:sld>
 </file>
 
-<file path=ppt/slides/slide7.xml><?xml version="1.0" encoding="utf-8"?>
+<file path=ppt/slides/slide16.xml><?xml version="1.0" encoding="utf-8"?>
 <p:sld xmlns:a="http://schemas.openxmlformats.org/drawingml/2006/main" xmlns:r="http://schemas.openxmlformats.org/officeDocument/2006/relationships" xmlns:p="http://schemas.openxmlformats.org/presentationml/2006/main">
   <p:cSld>
+    <p:bg>
+      <p:bgPr>
+        <a:solidFill>
+          <a:schemeClr val="bg1">
+            <a:lumMod val="85000"/>
+          </a:schemeClr>
+        </a:solidFill>
+        <a:effectLst/>
+      </p:bgPr>
+    </p:bg>
     <p:spTree>
       <p:nvGrpSpPr>
         <p:cNvPr id="1" name=""/>
@@ -3781,12 +3985,8 @@
           <a:lstStyle/>
           <a:p>
             <a:r>
-              <a:rPr lang="en-US" altLang="ko-KR" dirty="0" err="1" smtClean="0"/>
-              <a:t>setUIStates</a:t>
-            </a:r>
-            <a:r>
-              <a:rPr lang="en-US" altLang="ko-KR" dirty="0" smtClean="0"/>
-              <a:t>( )</a:t>
+              <a:rPr lang="en-US" altLang="ko-KR" dirty="0" smtClean="0"/>
+              <a:t>MainActivity.java 3</a:t>
             </a:r>
             <a:endParaRPr lang="ko-KR" altLang="en-US" dirty="0"/>
           </a:p>
@@ -3808,40 +4008,29 @@
           <a:lstStyle/>
           <a:p>
             <a:r>
-              <a:rPr lang="en-US" altLang="ko-KR" dirty="0" smtClean="0"/>
-              <a:t>INITIAL_STATE :</a:t>
-            </a:r>
-          </a:p>
-          <a:p>
-            <a:pPr lvl="1">
-              <a:buNone/>
-            </a:pPr>
-            <a:endParaRPr lang="en-US" altLang="ko-KR" dirty="0" smtClean="0"/>
-          </a:p>
-          <a:p>
-            <a:r>
-              <a:rPr lang="en-US" altLang="ko-KR" dirty="0" smtClean="0"/>
-              <a:t>ADMIN_ENABLED :</a:t>
-            </a:r>
-          </a:p>
-          <a:p>
-            <a:endParaRPr lang="en-US" altLang="ko-KR" dirty="0"/>
-          </a:p>
-          <a:p>
-            <a:r>
-              <a:rPr lang="en-US" altLang="ko-KR" dirty="0" smtClean="0"/>
-              <a:t>ADMIN_DISABLED :</a:t>
-            </a:r>
-          </a:p>
-          <a:p>
-            <a:endParaRPr lang="en-US" altLang="ko-KR" dirty="0"/>
-          </a:p>
-          <a:p>
-            <a:r>
-              <a:rPr lang="en-US" altLang="ko-KR" dirty="0" smtClean="0"/>
-              <a:t>RESULT_ELM_ACTIVATED :</a:t>
-            </a:r>
-            <a:endParaRPr lang="en-US" altLang="ko-KR" dirty="0"/>
+              <a:rPr lang="en-US" altLang="ko-KR" dirty="0" err="1" smtClean="0"/>
+              <a:t>edm.getApplicationPolicy</a:t>
+            </a:r>
+            <a:r>
+              <a:rPr lang="en-US" altLang="ko-KR" dirty="0" smtClean="0"/>
+              <a:t>( ).</a:t>
+            </a:r>
+            <a:r>
+              <a:rPr lang="en-US" altLang="ko-KR" dirty="0" err="1" smtClean="0"/>
+              <a:t>getApplicationStateList</a:t>
+            </a:r>
+            <a:r>
+              <a:rPr lang="en-US" altLang="ko-KR" dirty="0" smtClean="0"/>
+              <a:t>( state ) </a:t>
+            </a:r>
+          </a:p>
+          <a:p>
+            <a:pPr lvl="1"/>
+            <a:r>
+              <a:rPr lang="en-US" altLang="ko-KR" dirty="0" smtClean="0"/>
+              <a:t>returns enabled or disabled list of app.</a:t>
+            </a:r>
+            <a:endParaRPr lang="ko-KR" altLang="en-US" dirty="0"/>
           </a:p>
         </p:txBody>
       </p:sp>
@@ -3850,12 +4039,27 @@
   <p:clrMapOvr>
     <a:masterClrMapping/>
   </p:clrMapOvr>
+  <p:timing>
+    <p:tnLst>
+      <p:par>
+        <p:cTn id="1" dur="indefinite" restart="never" nodeType="tmRoot"/>
+      </p:par>
+    </p:tnLst>
+  </p:timing>
 </p:sld>
 </file>
 
-<file path=ppt/slides/slide8.xml><?xml version="1.0" encoding="utf-8"?>
+<file path=ppt/slides/slide2.xml><?xml version="1.0" encoding="utf-8"?>
 <p:sld xmlns:a="http://schemas.openxmlformats.org/drawingml/2006/main" xmlns:r="http://schemas.openxmlformats.org/officeDocument/2006/relationships" xmlns:p="http://schemas.openxmlformats.org/presentationml/2006/main">
   <p:cSld>
+    <p:bg>
+      <p:bgPr>
+        <a:solidFill>
+          <a:schemeClr val="accent3"/>
+        </a:solidFill>
+        <a:effectLst/>
+      </p:bgPr>
+    </p:bg>
     <p:spTree>
       <p:nvGrpSpPr>
         <p:cNvPr id="1" name=""/>
@@ -3886,12 +4090,8 @@
           <a:lstStyle/>
           <a:p>
             <a:r>
-              <a:rPr lang="en-US" altLang="ko-KR" dirty="0" err="1" smtClean="0"/>
-              <a:t>activateAdmin</a:t>
-            </a:r>
-            <a:r>
-              <a:rPr lang="en-US" altLang="ko-KR" dirty="0" smtClean="0"/>
-              <a:t>(context) </a:t>
+              <a:rPr lang="en-US" altLang="ko-KR" dirty="0" smtClean="0"/>
+              <a:t>AdminLicenseActivation.java</a:t>
             </a:r>
             <a:endParaRPr lang="ko-KR" altLang="en-US" dirty="0"/>
           </a:p>
@@ -3909,266 +4109,38 @@
         </p:nvSpPr>
         <p:spPr/>
         <p:txBody>
-          <a:bodyPr>
-            <a:normAutofit fontScale="77500" lnSpcReduction="20000"/>
-          </a:bodyPr>
-          <a:lstStyle/>
-          <a:p>
-            <a:r>
-              <a:rPr lang="en-US" altLang="ko-KR" dirty="0" smtClean="0"/>
-              <a:t>_</a:t>
-            </a:r>
-            <a:r>
-              <a:rPr lang="en-US" altLang="ko-KR" dirty="0" err="1" smtClean="0"/>
-              <a:t>dpm</a:t>
-            </a:r>
-            <a:r>
-              <a:rPr lang="en-US" altLang="ko-KR" dirty="0"/>
-              <a:t> </a:t>
-            </a:r>
-            <a:r>
-              <a:rPr lang="en-US" altLang="ko-KR" dirty="0" smtClean="0"/>
-              <a:t>= (</a:t>
-            </a:r>
-            <a:r>
-              <a:rPr lang="en-US" altLang="ko-KR" dirty="0" err="1" smtClean="0"/>
-              <a:t>DevicePolicyManager</a:t>
-            </a:r>
-            <a:r>
-              <a:rPr lang="en-US" altLang="ko-KR" dirty="0" smtClean="0"/>
-              <a:t>)</a:t>
-            </a:r>
+          <a:bodyPr/>
+          <a:lstStyle/>
+          <a:p>
+            <a:r>
+              <a:rPr lang="en-US" altLang="ko-KR" dirty="0" smtClean="0"/>
+              <a:t>Launcher activity of the app</a:t>
+            </a:r>
+          </a:p>
+          <a:p>
+            <a:endParaRPr lang="en-US" altLang="ko-KR" dirty="0"/>
+          </a:p>
+          <a:p>
+            <a:r>
+              <a:rPr lang="en-US" altLang="ko-KR" dirty="0" smtClean="0"/>
+              <a:t>Helps in </a:t>
+            </a:r>
+            <a:r>
+              <a:rPr lang="en-US" altLang="ko-KR" dirty="0" smtClean="0"/>
+              <a:t>enabling </a:t>
+            </a:r>
+            <a:r>
+              <a:rPr lang="en-US" altLang="ko-KR" dirty="0" smtClean="0"/>
+              <a:t>admin and activating ELM</a:t>
+            </a:r>
+          </a:p>
+          <a:p>
+            <a:endParaRPr lang="en-US" altLang="ko-KR" dirty="0"/>
           </a:p>
           <a:p>
             <a:pPr>
               <a:buNone/>
             </a:pPr>
-            <a:r>
-              <a:rPr lang="en-US" altLang="ko-KR" dirty="0" smtClean="0"/>
-              <a:t>		</a:t>
-            </a:r>
-            <a:r>
-              <a:rPr lang="en-US" altLang="ko-KR" dirty="0" err="1" smtClean="0"/>
-              <a:t>context.getSystemService</a:t>
-            </a:r>
-            <a:r>
-              <a:rPr lang="en-US" altLang="ko-KR" dirty="0" smtClean="0"/>
-              <a:t>(</a:t>
-            </a:r>
-          </a:p>
-          <a:p>
-            <a:pPr>
-              <a:buNone/>
-            </a:pPr>
-            <a:r>
-              <a:rPr lang="en-US" altLang="ko-KR" dirty="0"/>
-              <a:t>	</a:t>
-            </a:r>
-            <a:r>
-              <a:rPr lang="en-US" altLang="ko-KR" dirty="0" smtClean="0"/>
-              <a:t>		</a:t>
-            </a:r>
-            <a:r>
-              <a:rPr lang="en-US" altLang="ko-KR" dirty="0" err="1" smtClean="0"/>
-              <a:t>Context.DEVICE_POLICY_SERVICE</a:t>
-            </a:r>
-            <a:r>
-              <a:rPr lang="en-US" altLang="ko-KR" dirty="0" smtClean="0"/>
-              <a:t>) ;	</a:t>
-            </a:r>
-            <a:endParaRPr lang="en-US" altLang="ko-KR" dirty="0"/>
-          </a:p>
-          <a:p>
-            <a:r>
-              <a:rPr lang="en-US" altLang="ko-KR" dirty="0" smtClean="0"/>
-              <a:t>_</a:t>
-            </a:r>
-            <a:r>
-              <a:rPr lang="en-US" altLang="ko-KR" dirty="0" err="1" smtClean="0"/>
-              <a:t>cn</a:t>
-            </a:r>
-            <a:r>
-              <a:rPr lang="en-US" altLang="ko-KR" dirty="0" smtClean="0"/>
-              <a:t> = new </a:t>
-            </a:r>
-            <a:r>
-              <a:rPr lang="en-US" altLang="ko-KR" dirty="0" err="1" smtClean="0"/>
-              <a:t>ComponentName</a:t>
-            </a:r>
-            <a:r>
-              <a:rPr lang="en-US" altLang="ko-KR" dirty="0" smtClean="0"/>
-              <a:t>( context, </a:t>
-            </a:r>
-            <a:r>
-              <a:rPr lang="en-US" altLang="ko-KR" dirty="0" err="1" smtClean="0"/>
-              <a:t>DeviceAdministrator.class</a:t>
-            </a:r>
-            <a:r>
-              <a:rPr lang="en-US" altLang="ko-KR" dirty="0" smtClean="0"/>
-              <a:t>) ;</a:t>
-            </a:r>
-          </a:p>
-          <a:p>
-            <a:r>
-              <a:rPr lang="en-US" altLang="ko-KR" dirty="0" smtClean="0"/>
-              <a:t>if( _</a:t>
-            </a:r>
-            <a:r>
-              <a:rPr lang="en-US" altLang="ko-KR" dirty="0" err="1" smtClean="0"/>
-              <a:t>dpm</a:t>
-            </a:r>
-            <a:r>
-              <a:rPr lang="en-US" altLang="ko-KR" dirty="0" smtClean="0"/>
-              <a:t> != null &amp;&amp; !_</a:t>
-            </a:r>
-            <a:r>
-              <a:rPr lang="en-US" altLang="ko-KR" dirty="0" err="1" smtClean="0"/>
-              <a:t>dpm.isAdminActive</a:t>
-            </a:r>
-            <a:r>
-              <a:rPr lang="en-US" altLang="ko-KR" dirty="0" smtClean="0"/>
-              <a:t>( _</a:t>
-            </a:r>
-            <a:r>
-              <a:rPr lang="en-US" altLang="ko-KR" dirty="0" err="1" smtClean="0"/>
-              <a:t>cn</a:t>
-            </a:r>
-            <a:r>
-              <a:rPr lang="en-US" altLang="ko-KR" dirty="0" smtClean="0"/>
-              <a:t> ) ) {</a:t>
-            </a:r>
-          </a:p>
-          <a:p>
-            <a:pPr>
-              <a:buNone/>
-            </a:pPr>
-            <a:r>
-              <a:rPr lang="en-US" altLang="ko-KR" dirty="0"/>
-              <a:t>	</a:t>
-            </a:r>
-            <a:r>
-              <a:rPr lang="en-US" altLang="ko-KR" dirty="0" smtClean="0"/>
-              <a:t>	Intent </a:t>
-            </a:r>
-            <a:r>
-              <a:rPr lang="en-US" altLang="ko-KR" dirty="0" err="1" smtClean="0"/>
-              <a:t>i</a:t>
-            </a:r>
-            <a:r>
-              <a:rPr lang="en-US" altLang="ko-KR" dirty="0" smtClean="0"/>
-              <a:t> = new Intent( </a:t>
-            </a:r>
-            <a:r>
-              <a:rPr lang="en-US" altLang="ko-KR" dirty="0" err="1" smtClean="0"/>
-              <a:t>DevicePolicyManger</a:t>
-            </a:r>
-            <a:r>
-              <a:rPr lang="en-US" altLang="ko-KR" dirty="0" smtClean="0"/>
-              <a:t>.</a:t>
-            </a:r>
-          </a:p>
-          <a:p>
-            <a:pPr>
-              <a:buNone/>
-            </a:pPr>
-            <a:r>
-              <a:rPr lang="en-US" altLang="ko-KR" dirty="0"/>
-              <a:t>	</a:t>
-            </a:r>
-            <a:r>
-              <a:rPr lang="en-US" altLang="ko-KR" dirty="0" smtClean="0"/>
-              <a:t>		ACTION_ADD_DEVICE_ADMIN ) ;</a:t>
-            </a:r>
-          </a:p>
-          <a:p>
-            <a:pPr>
-              <a:buNone/>
-            </a:pPr>
-            <a:r>
-              <a:rPr lang="en-US" altLang="ko-KR" dirty="0" smtClean="0"/>
-              <a:t>		</a:t>
-            </a:r>
-            <a:r>
-              <a:rPr lang="en-US" altLang="ko-KR" dirty="0" err="1" smtClean="0"/>
-              <a:t>i.putExtra</a:t>
-            </a:r>
-            <a:r>
-              <a:rPr lang="en-US" altLang="ko-KR" dirty="0" smtClean="0"/>
-              <a:t>(</a:t>
-            </a:r>
-            <a:r>
-              <a:rPr lang="en-US" altLang="ko-KR" dirty="0" err="1" smtClean="0"/>
-              <a:t>DevicePolicyManager</a:t>
-            </a:r>
-            <a:r>
-              <a:rPr lang="en-US" altLang="ko-KR" dirty="0" smtClean="0"/>
-              <a:t>.</a:t>
-            </a:r>
-          </a:p>
-          <a:p>
-            <a:pPr>
-              <a:buNone/>
-            </a:pPr>
-            <a:r>
-              <a:rPr lang="en-US" altLang="ko-KR" dirty="0"/>
-              <a:t>	</a:t>
-            </a:r>
-            <a:r>
-              <a:rPr lang="en-US" altLang="ko-KR" dirty="0" smtClean="0"/>
-              <a:t>		EXTRA_DEVICE_ADMIN, _</a:t>
-            </a:r>
-            <a:r>
-              <a:rPr lang="en-US" altLang="ko-KR" dirty="0" err="1" smtClean="0"/>
-              <a:t>cn</a:t>
-            </a:r>
-            <a:r>
-              <a:rPr lang="en-US" altLang="ko-KR" dirty="0" smtClean="0"/>
-              <a:t> ) ;</a:t>
-            </a:r>
-          </a:p>
-          <a:p>
-            <a:pPr>
-              <a:buNone/>
-            </a:pPr>
-            <a:r>
-              <a:rPr lang="en-US" altLang="ko-KR" dirty="0"/>
-              <a:t>	</a:t>
-            </a:r>
-            <a:r>
-              <a:rPr lang="en-US" altLang="ko-KR" dirty="0" smtClean="0"/>
-              <a:t>	</a:t>
-            </a:r>
-            <a:r>
-              <a:rPr lang="en-US" altLang="ko-KR" dirty="0" err="1" smtClean="0"/>
-              <a:t>context.startActivity</a:t>
-            </a:r>
-            <a:r>
-              <a:rPr lang="en-US" altLang="ko-KR" dirty="0" smtClean="0"/>
-              <a:t>( </a:t>
-            </a:r>
-            <a:r>
-              <a:rPr lang="en-US" altLang="ko-KR" dirty="0" err="1" smtClean="0"/>
-              <a:t>i</a:t>
-            </a:r>
-            <a:r>
-              <a:rPr lang="en-US" altLang="ko-KR" dirty="0" smtClean="0"/>
-              <a:t> ) ;</a:t>
-            </a:r>
-          </a:p>
-          <a:p>
-            <a:pPr>
-              <a:buNone/>
-            </a:pPr>
-            <a:r>
-              <a:rPr lang="en-US" altLang="ko-KR" dirty="0"/>
-              <a:t>	</a:t>
-            </a:r>
-            <a:r>
-              <a:rPr lang="en-US" altLang="ko-KR" dirty="0" smtClean="0"/>
-              <a:t>	*	*	*</a:t>
-            </a:r>
-          </a:p>
-          <a:p>
             <a:endParaRPr lang="ko-KR" altLang="en-US" dirty="0"/>
           </a:p>
         </p:txBody>
@@ -4178,12 +4150,27 @@
   <p:clrMapOvr>
     <a:masterClrMapping/>
   </p:clrMapOvr>
+  <p:timing>
+    <p:tnLst>
+      <p:par>
+        <p:cTn id="1" dur="indefinite" restart="never" nodeType="tmRoot"/>
+      </p:par>
+    </p:tnLst>
+  </p:timing>
 </p:sld>
 </file>
 
-<file path=ppt/slides/slide9.xml><?xml version="1.0" encoding="utf-8"?>
+<file path=ppt/slides/slide3.xml><?xml version="1.0" encoding="utf-8"?>
 <p:sld xmlns:a="http://schemas.openxmlformats.org/drawingml/2006/main" xmlns:r="http://schemas.openxmlformats.org/officeDocument/2006/relationships" xmlns:p="http://schemas.openxmlformats.org/presentationml/2006/main">
   <p:cSld>
+    <p:bg>
+      <p:bgPr>
+        <a:solidFill>
+          <a:schemeClr val="accent3"/>
+        </a:solidFill>
+        <a:effectLst/>
+      </p:bgPr>
+    </p:bg>
     <p:spTree>
       <p:nvGrpSpPr>
         <p:cNvPr id="1" name=""/>
@@ -4210,16 +4197,18 @@
         </p:nvSpPr>
         <p:spPr/>
         <p:txBody>
-          <a:bodyPr/>
-          <a:lstStyle/>
-          <a:p>
-            <a:r>
-              <a:rPr lang="en-US" altLang="ko-KR" dirty="0" err="1" smtClean="0"/>
-              <a:t>deactivateAdmin</a:t>
-            </a:r>
-            <a:r>
-              <a:rPr lang="en-US" altLang="ko-KR" dirty="0" smtClean="0"/>
-              <a:t>( )</a:t>
+          <a:bodyPr>
+            <a:normAutofit fontScale="90000"/>
+          </a:bodyPr>
+          <a:lstStyle/>
+          <a:p>
+            <a:r>
+              <a:rPr lang="en-US" altLang="ko-KR" dirty="0" err="1" smtClean="0"/>
+              <a:t>AdminLicenseActivation</a:t>
+            </a:r>
+            <a:r>
+              <a:rPr lang="en-US" altLang="ko-KR" dirty="0" smtClean="0"/>
+              <a:t> Properties</a:t>
             </a:r>
             <a:endParaRPr lang="ko-KR" altLang="en-US" dirty="0"/>
           </a:p>
@@ -4240,7 +4229,77 @@
           <a:bodyPr/>
           <a:lstStyle/>
           <a:p>
-            <a:endParaRPr lang="ko-KR" altLang="en-US" dirty="0"/>
+            <a:r>
+              <a:rPr lang="en-US" altLang="ko-KR" dirty="0" err="1" smtClean="0"/>
+              <a:t>DevicePolicyManager</a:t>
+            </a:r>
+            <a:r>
+              <a:rPr lang="en-US" altLang="ko-KR" dirty="0" smtClean="0"/>
+              <a:t> </a:t>
+            </a:r>
+            <a:r>
+              <a:rPr lang="en-US" altLang="ko-KR" dirty="0" smtClean="0"/>
+              <a:t>_</a:t>
+            </a:r>
+            <a:r>
+              <a:rPr lang="en-US" altLang="ko-KR" dirty="0" err="1" smtClean="0"/>
+              <a:t>dpm</a:t>
+            </a:r>
+            <a:endParaRPr lang="en-US" altLang="ko-KR" dirty="0" smtClean="0"/>
+          </a:p>
+          <a:p>
+            <a:endParaRPr lang="en-US" altLang="ko-KR" dirty="0"/>
+          </a:p>
+          <a:p>
+            <a:r>
+              <a:rPr lang="en-US" altLang="ko-KR" dirty="0" err="1" smtClean="0"/>
+              <a:t>ComponentName</a:t>
+            </a:r>
+            <a:r>
+              <a:rPr lang="en-US" altLang="ko-KR" dirty="0" smtClean="0"/>
+              <a:t> _</a:t>
+            </a:r>
+            <a:r>
+              <a:rPr lang="en-US" altLang="ko-KR" dirty="0" err="1" smtClean="0"/>
+              <a:t>cn</a:t>
+            </a:r>
+            <a:endParaRPr lang="en-US" altLang="ko-KR" dirty="0" smtClean="0"/>
+          </a:p>
+          <a:p>
+            <a:endParaRPr lang="en-US" altLang="ko-KR" dirty="0"/>
+          </a:p>
+          <a:p>
+            <a:r>
+              <a:rPr lang="en-US" altLang="ko-KR" dirty="0" err="1" smtClean="0"/>
+              <a:t>LicenseReceiver</a:t>
+            </a:r>
+            <a:r>
+              <a:rPr lang="en-US" altLang="ko-KR" dirty="0" smtClean="0"/>
+              <a:t> _</a:t>
+            </a:r>
+            <a:r>
+              <a:rPr lang="en-US" altLang="ko-KR" dirty="0" err="1" smtClean="0"/>
+              <a:t>lr</a:t>
+            </a:r>
+            <a:endParaRPr lang="en-US" altLang="ko-KR" dirty="0" smtClean="0"/>
+          </a:p>
+          <a:p>
+            <a:endParaRPr lang="en-US" altLang="ko-KR" dirty="0"/>
+          </a:p>
+          <a:p>
+            <a:r>
+              <a:rPr lang="en-US" altLang="ko-KR" dirty="0" err="1" smtClean="0"/>
+              <a:t>DeviceAdministrator</a:t>
+            </a:r>
+            <a:r>
+              <a:rPr lang="en-US" altLang="ko-KR" dirty="0" smtClean="0"/>
+              <a:t> _</a:t>
+            </a:r>
+            <a:r>
+              <a:rPr lang="en-US" altLang="ko-KR" dirty="0" err="1" smtClean="0"/>
+              <a:t>da</a:t>
+            </a:r>
+            <a:endParaRPr lang="en-US" altLang="ko-KR" dirty="0" smtClean="0"/>
           </a:p>
         </p:txBody>
       </p:sp>
@@ -4249,6 +4308,928 @@
   <p:clrMapOvr>
     <a:masterClrMapping/>
   </p:clrMapOvr>
+  <p:timing>
+    <p:tnLst>
+      <p:par>
+        <p:cTn id="1" dur="indefinite" restart="never" nodeType="tmRoot"/>
+      </p:par>
+    </p:tnLst>
+  </p:timing>
+</p:sld>
+</file>
+
+<file path=ppt/slides/slide4.xml><?xml version="1.0" encoding="utf-8"?>
+<p:sld xmlns:a="http://schemas.openxmlformats.org/drawingml/2006/main" xmlns:r="http://schemas.openxmlformats.org/officeDocument/2006/relationships" xmlns:p="http://schemas.openxmlformats.org/presentationml/2006/main">
+  <p:cSld>
+    <p:bg>
+      <p:bgPr>
+        <a:solidFill>
+          <a:schemeClr val="accent3"/>
+        </a:solidFill>
+        <a:effectLst/>
+      </p:bgPr>
+    </p:bg>
+    <p:spTree>
+      <p:nvGrpSpPr>
+        <p:cNvPr id="1" name=""/>
+        <p:cNvGrpSpPr/>
+        <p:nvPr/>
+      </p:nvGrpSpPr>
+      <p:grpSpPr>
+        <a:xfrm>
+          <a:off x="0" y="0"/>
+          <a:ext cx="0" cy="0"/>
+          <a:chOff x="0" y="0"/>
+          <a:chExt cx="0" cy="0"/>
+        </a:xfrm>
+      </p:grpSpPr>
+      <p:sp>
+        <p:nvSpPr>
+          <p:cNvPr id="2" name="제목 1"/>
+          <p:cNvSpPr>
+            <a:spLocks noGrp="1"/>
+          </p:cNvSpPr>
+          <p:nvPr>
+            <p:ph type="title"/>
+          </p:nvPr>
+        </p:nvSpPr>
+        <p:spPr/>
+        <p:txBody>
+          <a:bodyPr/>
+          <a:lstStyle/>
+          <a:p>
+            <a:r>
+              <a:rPr lang="en-US" altLang="ko-KR" dirty="0" smtClean="0"/>
+              <a:t>Declaring Handler</a:t>
+            </a:r>
+            <a:endParaRPr lang="ko-KR" altLang="en-US" dirty="0"/>
+          </a:p>
+        </p:txBody>
+      </p:sp>
+      <p:sp>
+        <p:nvSpPr>
+          <p:cNvPr id="3" name="내용 개체 틀 2"/>
+          <p:cNvSpPr>
+            <a:spLocks noGrp="1"/>
+          </p:cNvSpPr>
+          <p:nvPr>
+            <p:ph idx="1"/>
+          </p:nvPr>
+        </p:nvSpPr>
+        <p:spPr/>
+        <p:txBody>
+          <a:bodyPr/>
+          <a:lstStyle/>
+          <a:p>
+            <a:r>
+              <a:rPr lang="en-US" altLang="ko-KR" dirty="0" smtClean="0"/>
+              <a:t>handles messages from </a:t>
+            </a:r>
+            <a:r>
+              <a:rPr lang="en-US" altLang="ko-KR" dirty="0" err="1" smtClean="0"/>
+              <a:t>DeviceAdminstrator</a:t>
+            </a:r>
+            <a:r>
+              <a:rPr lang="en-US" altLang="ko-KR" dirty="0" smtClean="0"/>
+              <a:t> and </a:t>
+            </a:r>
+            <a:r>
+              <a:rPr lang="en-US" altLang="ko-KR" dirty="0" err="1" smtClean="0"/>
+              <a:t>LicenseReceiver</a:t>
+            </a:r>
+            <a:endParaRPr lang="ko-KR" altLang="en-US" dirty="0"/>
+          </a:p>
+        </p:txBody>
+      </p:sp>
+    </p:spTree>
+  </p:cSld>
+  <p:clrMapOvr>
+    <a:masterClrMapping/>
+  </p:clrMapOvr>
+  <p:timing>
+    <p:tnLst>
+      <p:par>
+        <p:cTn id="1" dur="indefinite" restart="never" nodeType="tmRoot"/>
+      </p:par>
+    </p:tnLst>
+  </p:timing>
+</p:sld>
+</file>
+
+<file path=ppt/slides/slide5.xml><?xml version="1.0" encoding="utf-8"?>
+<p:sld xmlns:a="http://schemas.openxmlformats.org/drawingml/2006/main" xmlns:r="http://schemas.openxmlformats.org/officeDocument/2006/relationships" xmlns:p="http://schemas.openxmlformats.org/presentationml/2006/main">
+  <p:cSld>
+    <p:bg>
+      <p:bgPr>
+        <a:solidFill>
+          <a:schemeClr val="accent3"/>
+        </a:solidFill>
+        <a:effectLst/>
+      </p:bgPr>
+    </p:bg>
+    <p:spTree>
+      <p:nvGrpSpPr>
+        <p:cNvPr id="1" name=""/>
+        <p:cNvGrpSpPr/>
+        <p:nvPr/>
+      </p:nvGrpSpPr>
+      <p:grpSpPr>
+        <a:xfrm>
+          <a:off x="0" y="0"/>
+          <a:ext cx="0" cy="0"/>
+          <a:chOff x="0" y="0"/>
+          <a:chExt cx="0" cy="0"/>
+        </a:xfrm>
+      </p:grpSpPr>
+      <p:sp>
+        <p:nvSpPr>
+          <p:cNvPr id="2" name="제목 1"/>
+          <p:cNvSpPr>
+            <a:spLocks noGrp="1"/>
+          </p:cNvSpPr>
+          <p:nvPr>
+            <p:ph type="title"/>
+          </p:nvPr>
+        </p:nvSpPr>
+        <p:spPr/>
+        <p:txBody>
+          <a:bodyPr/>
+          <a:lstStyle/>
+          <a:p>
+            <a:r>
+              <a:rPr lang="en-US" altLang="ko-KR" dirty="0" err="1" smtClean="0"/>
+              <a:t>onCreate</a:t>
+            </a:r>
+            <a:r>
+              <a:rPr lang="en-US" altLang="ko-KR" dirty="0" smtClean="0"/>
+              <a:t>( )</a:t>
+            </a:r>
+            <a:endParaRPr lang="ko-KR" altLang="en-US" dirty="0"/>
+          </a:p>
+        </p:txBody>
+      </p:sp>
+      <p:sp>
+        <p:nvSpPr>
+          <p:cNvPr id="3" name="내용 개체 틀 2"/>
+          <p:cNvSpPr>
+            <a:spLocks noGrp="1"/>
+          </p:cNvSpPr>
+          <p:nvPr>
+            <p:ph idx="1"/>
+          </p:nvPr>
+        </p:nvSpPr>
+        <p:spPr/>
+        <p:txBody>
+          <a:bodyPr/>
+          <a:lstStyle/>
+          <a:p>
+            <a:r>
+              <a:rPr lang="en-US" altLang="ko-KR" dirty="0" smtClean="0"/>
+              <a:t>_</a:t>
+            </a:r>
+            <a:r>
+              <a:rPr lang="en-US" altLang="ko-KR" dirty="0" err="1" smtClean="0"/>
+              <a:t>lr</a:t>
+            </a:r>
+            <a:r>
+              <a:rPr lang="en-US" altLang="ko-KR" dirty="0" smtClean="0"/>
+              <a:t> = new </a:t>
+            </a:r>
+            <a:r>
+              <a:rPr lang="en-US" altLang="ko-KR" dirty="0" err="1" smtClean="0"/>
+              <a:t>LicenseReceiver</a:t>
+            </a:r>
+            <a:r>
+              <a:rPr lang="en-US" altLang="ko-KR" dirty="0" smtClean="0"/>
+              <a:t>(_handler) </a:t>
+            </a:r>
+            <a:endParaRPr lang="en-US" altLang="ko-KR" dirty="0" smtClean="0"/>
+          </a:p>
+          <a:p>
+            <a:endParaRPr lang="en-US" altLang="ko-KR" dirty="0"/>
+          </a:p>
+          <a:p>
+            <a:r>
+              <a:rPr lang="en-US" altLang="ko-KR" dirty="0" smtClean="0"/>
+              <a:t>_</a:t>
+            </a:r>
+            <a:r>
+              <a:rPr lang="en-US" altLang="ko-KR" dirty="0" err="1" smtClean="0"/>
+              <a:t>da</a:t>
+            </a:r>
+            <a:r>
+              <a:rPr lang="en-US" altLang="ko-KR" dirty="0" smtClean="0"/>
+              <a:t> = new </a:t>
+            </a:r>
+            <a:r>
+              <a:rPr lang="en-US" altLang="ko-KR" dirty="0" err="1" smtClean="0"/>
+              <a:t>DeviceAdministrator</a:t>
+            </a:r>
+            <a:r>
+              <a:rPr lang="en-US" altLang="ko-KR" dirty="0" smtClean="0"/>
+              <a:t>(_handler)</a:t>
+            </a:r>
+            <a:endParaRPr lang="ko-KR" altLang="en-US" dirty="0"/>
+          </a:p>
+        </p:txBody>
+      </p:sp>
+    </p:spTree>
+  </p:cSld>
+  <p:clrMapOvr>
+    <a:masterClrMapping/>
+  </p:clrMapOvr>
+  <p:timing>
+    <p:tnLst>
+      <p:par>
+        <p:cTn id="1" dur="indefinite" restart="never" nodeType="tmRoot"/>
+      </p:par>
+    </p:tnLst>
+  </p:timing>
+</p:sld>
+</file>
+
+<file path=ppt/slides/slide6.xml><?xml version="1.0" encoding="utf-8"?>
+<p:sld xmlns:a="http://schemas.openxmlformats.org/drawingml/2006/main" xmlns:r="http://schemas.openxmlformats.org/officeDocument/2006/relationships" xmlns:p="http://schemas.openxmlformats.org/presentationml/2006/main">
+  <p:cSld>
+    <p:bg>
+      <p:bgPr>
+        <a:solidFill>
+          <a:schemeClr val="accent3"/>
+        </a:solidFill>
+        <a:effectLst/>
+      </p:bgPr>
+    </p:bg>
+    <p:spTree>
+      <p:nvGrpSpPr>
+        <p:cNvPr id="1" name=""/>
+        <p:cNvGrpSpPr/>
+        <p:nvPr/>
+      </p:nvGrpSpPr>
+      <p:grpSpPr>
+        <a:xfrm>
+          <a:off x="0" y="0"/>
+          <a:ext cx="0" cy="0"/>
+          <a:chOff x="0" y="0"/>
+          <a:chExt cx="0" cy="0"/>
+        </a:xfrm>
+      </p:grpSpPr>
+      <p:sp>
+        <p:nvSpPr>
+          <p:cNvPr id="2" name="제목 1"/>
+          <p:cNvSpPr>
+            <a:spLocks noGrp="1"/>
+          </p:cNvSpPr>
+          <p:nvPr>
+            <p:ph type="title"/>
+          </p:nvPr>
+        </p:nvSpPr>
+        <p:spPr/>
+        <p:txBody>
+          <a:bodyPr/>
+          <a:lstStyle/>
+          <a:p>
+            <a:r>
+              <a:rPr lang="en-US" altLang="ko-KR" dirty="0" err="1" smtClean="0"/>
+              <a:t>onResume</a:t>
+            </a:r>
+            <a:r>
+              <a:rPr lang="en-US" altLang="ko-KR" dirty="0" smtClean="0"/>
+              <a:t>( )</a:t>
+            </a:r>
+            <a:endParaRPr lang="ko-KR" altLang="en-US" dirty="0"/>
+          </a:p>
+        </p:txBody>
+      </p:sp>
+      <p:sp>
+        <p:nvSpPr>
+          <p:cNvPr id="3" name="내용 개체 틀 2"/>
+          <p:cNvSpPr>
+            <a:spLocks noGrp="1"/>
+          </p:cNvSpPr>
+          <p:nvPr>
+            <p:ph idx="1"/>
+          </p:nvPr>
+        </p:nvSpPr>
+        <p:spPr/>
+        <p:txBody>
+          <a:bodyPr/>
+          <a:lstStyle/>
+          <a:p>
+            <a:r>
+              <a:rPr lang="en-US" altLang="ko-KR" dirty="0" err="1" smtClean="0"/>
+              <a:t>isActivityVisble</a:t>
+            </a:r>
+            <a:r>
+              <a:rPr lang="en-US" altLang="ko-KR" dirty="0" smtClean="0"/>
+              <a:t> = true </a:t>
+            </a:r>
+          </a:p>
+          <a:p>
+            <a:endParaRPr lang="en-US" altLang="ko-KR" dirty="0" smtClean="0"/>
+          </a:p>
+          <a:p>
+            <a:r>
+              <a:rPr lang="en-US" altLang="ko-KR" dirty="0" err="1" smtClean="0"/>
+              <a:t>setUIStates</a:t>
+            </a:r>
+            <a:r>
+              <a:rPr lang="en-US" altLang="ko-KR" dirty="0" smtClean="0"/>
+              <a:t>(</a:t>
+            </a:r>
+            <a:r>
+              <a:rPr lang="en-US" altLang="ko-KR" dirty="0" err="1" smtClean="0"/>
+              <a:t>SAConstants.INITIAL_STATE</a:t>
+            </a:r>
+            <a:r>
+              <a:rPr lang="en-US" altLang="ko-KR" dirty="0" smtClean="0"/>
+              <a:t>)</a:t>
+            </a:r>
+          </a:p>
+          <a:p>
+            <a:endParaRPr lang="ko-KR" altLang="en-US" dirty="0"/>
+          </a:p>
+        </p:txBody>
+      </p:sp>
+    </p:spTree>
+  </p:cSld>
+  <p:clrMapOvr>
+    <a:masterClrMapping/>
+  </p:clrMapOvr>
+  <p:timing>
+    <p:tnLst>
+      <p:par>
+        <p:cTn id="1" dur="indefinite" restart="never" nodeType="tmRoot"/>
+      </p:par>
+    </p:tnLst>
+  </p:timing>
+</p:sld>
+</file>
+
+<file path=ppt/slides/slide7.xml><?xml version="1.0" encoding="utf-8"?>
+<p:sld xmlns:a="http://schemas.openxmlformats.org/drawingml/2006/main" xmlns:r="http://schemas.openxmlformats.org/officeDocument/2006/relationships" xmlns:p="http://schemas.openxmlformats.org/presentationml/2006/main">
+  <p:cSld>
+    <p:bg>
+      <p:bgPr>
+        <a:solidFill>
+          <a:schemeClr val="accent3"/>
+        </a:solidFill>
+        <a:effectLst/>
+      </p:bgPr>
+    </p:bg>
+    <p:spTree>
+      <p:nvGrpSpPr>
+        <p:cNvPr id="1" name=""/>
+        <p:cNvGrpSpPr/>
+        <p:nvPr/>
+      </p:nvGrpSpPr>
+      <p:grpSpPr>
+        <a:xfrm>
+          <a:off x="0" y="0"/>
+          <a:ext cx="0" cy="0"/>
+          <a:chOff x="0" y="0"/>
+          <a:chExt cx="0" cy="0"/>
+        </a:xfrm>
+      </p:grpSpPr>
+      <p:sp>
+        <p:nvSpPr>
+          <p:cNvPr id="2" name="제목 1"/>
+          <p:cNvSpPr>
+            <a:spLocks noGrp="1"/>
+          </p:cNvSpPr>
+          <p:nvPr>
+            <p:ph type="title"/>
+          </p:nvPr>
+        </p:nvSpPr>
+        <p:spPr/>
+        <p:txBody>
+          <a:bodyPr/>
+          <a:lstStyle/>
+          <a:p>
+            <a:r>
+              <a:rPr lang="en-US" altLang="ko-KR" dirty="0" err="1" smtClean="0"/>
+              <a:t>setUIStates</a:t>
+            </a:r>
+            <a:r>
+              <a:rPr lang="en-US" altLang="ko-KR" dirty="0" smtClean="0"/>
+              <a:t>( )</a:t>
+            </a:r>
+            <a:endParaRPr lang="ko-KR" altLang="en-US" dirty="0"/>
+          </a:p>
+        </p:txBody>
+      </p:sp>
+      <p:sp>
+        <p:nvSpPr>
+          <p:cNvPr id="3" name="내용 개체 틀 2"/>
+          <p:cNvSpPr>
+            <a:spLocks noGrp="1"/>
+          </p:cNvSpPr>
+          <p:nvPr>
+            <p:ph idx="1"/>
+          </p:nvPr>
+        </p:nvSpPr>
+        <p:spPr/>
+        <p:txBody>
+          <a:bodyPr/>
+          <a:lstStyle/>
+          <a:p>
+            <a:r>
+              <a:rPr lang="en-US" altLang="ko-KR" dirty="0" smtClean="0"/>
+              <a:t>INITIAL_STATE :</a:t>
+            </a:r>
+          </a:p>
+          <a:p>
+            <a:pPr lvl="1">
+              <a:buNone/>
+            </a:pPr>
+            <a:endParaRPr lang="en-US" altLang="ko-KR" dirty="0" smtClean="0"/>
+          </a:p>
+          <a:p>
+            <a:r>
+              <a:rPr lang="en-US" altLang="ko-KR" dirty="0" smtClean="0"/>
+              <a:t>ADMIN_ENABLED :</a:t>
+            </a:r>
+          </a:p>
+          <a:p>
+            <a:endParaRPr lang="en-US" altLang="ko-KR" dirty="0"/>
+          </a:p>
+          <a:p>
+            <a:r>
+              <a:rPr lang="en-US" altLang="ko-KR" dirty="0" smtClean="0"/>
+              <a:t>ADMIN_DISABLED :</a:t>
+            </a:r>
+          </a:p>
+          <a:p>
+            <a:endParaRPr lang="en-US" altLang="ko-KR" dirty="0"/>
+          </a:p>
+          <a:p>
+            <a:r>
+              <a:rPr lang="en-US" altLang="ko-KR" dirty="0" smtClean="0"/>
+              <a:t>RESULT_ELM_ACTIVATED :</a:t>
+            </a:r>
+            <a:endParaRPr lang="en-US" altLang="ko-KR" dirty="0"/>
+          </a:p>
+        </p:txBody>
+      </p:sp>
+    </p:spTree>
+  </p:cSld>
+  <p:clrMapOvr>
+    <a:masterClrMapping/>
+  </p:clrMapOvr>
+  <p:timing>
+    <p:tnLst>
+      <p:par>
+        <p:cTn id="1" dur="indefinite" restart="never" nodeType="tmRoot"/>
+      </p:par>
+    </p:tnLst>
+  </p:timing>
+</p:sld>
+</file>
+
+<file path=ppt/slides/slide8.xml><?xml version="1.0" encoding="utf-8"?>
+<p:sld xmlns:a="http://schemas.openxmlformats.org/drawingml/2006/main" xmlns:r="http://schemas.openxmlformats.org/officeDocument/2006/relationships" xmlns:p="http://schemas.openxmlformats.org/presentationml/2006/main">
+  <p:cSld>
+    <p:bg>
+      <p:bgPr>
+        <a:solidFill>
+          <a:schemeClr val="accent3"/>
+        </a:solidFill>
+        <a:effectLst/>
+      </p:bgPr>
+    </p:bg>
+    <p:spTree>
+      <p:nvGrpSpPr>
+        <p:cNvPr id="1" name=""/>
+        <p:cNvGrpSpPr/>
+        <p:nvPr/>
+      </p:nvGrpSpPr>
+      <p:grpSpPr>
+        <a:xfrm>
+          <a:off x="0" y="0"/>
+          <a:ext cx="0" cy="0"/>
+          <a:chOff x="0" y="0"/>
+          <a:chExt cx="0" cy="0"/>
+        </a:xfrm>
+      </p:grpSpPr>
+      <p:sp>
+        <p:nvSpPr>
+          <p:cNvPr id="2" name="제목 1"/>
+          <p:cNvSpPr>
+            <a:spLocks noGrp="1"/>
+          </p:cNvSpPr>
+          <p:nvPr>
+            <p:ph type="title"/>
+          </p:nvPr>
+        </p:nvSpPr>
+        <p:spPr/>
+        <p:txBody>
+          <a:bodyPr/>
+          <a:lstStyle/>
+          <a:p>
+            <a:r>
+              <a:rPr lang="en-US" altLang="ko-KR" dirty="0" err="1" smtClean="0"/>
+              <a:t>activateAdmin</a:t>
+            </a:r>
+            <a:r>
+              <a:rPr lang="en-US" altLang="ko-KR" dirty="0" smtClean="0"/>
+              <a:t>(context) </a:t>
+            </a:r>
+            <a:endParaRPr lang="ko-KR" altLang="en-US" dirty="0"/>
+          </a:p>
+        </p:txBody>
+      </p:sp>
+      <p:sp>
+        <p:nvSpPr>
+          <p:cNvPr id="3" name="내용 개체 틀 2"/>
+          <p:cNvSpPr>
+            <a:spLocks noGrp="1"/>
+          </p:cNvSpPr>
+          <p:nvPr>
+            <p:ph idx="1"/>
+          </p:nvPr>
+        </p:nvSpPr>
+        <p:spPr/>
+        <p:txBody>
+          <a:bodyPr>
+            <a:normAutofit fontScale="62500" lnSpcReduction="20000"/>
+          </a:bodyPr>
+          <a:lstStyle/>
+          <a:p>
+            <a:r>
+              <a:rPr lang="en-US" altLang="ko-KR" dirty="0" smtClean="0"/>
+              <a:t>_</a:t>
+            </a:r>
+            <a:r>
+              <a:rPr lang="en-US" altLang="ko-KR" dirty="0" err="1" smtClean="0"/>
+              <a:t>dpm</a:t>
+            </a:r>
+            <a:r>
+              <a:rPr lang="en-US" altLang="ko-KR" dirty="0"/>
+              <a:t> </a:t>
+            </a:r>
+            <a:r>
+              <a:rPr lang="en-US" altLang="ko-KR" dirty="0" smtClean="0"/>
+              <a:t>= (</a:t>
+            </a:r>
+            <a:r>
+              <a:rPr lang="en-US" altLang="ko-KR" dirty="0" err="1" smtClean="0"/>
+              <a:t>DevicePolicyManager</a:t>
+            </a:r>
+            <a:r>
+              <a:rPr lang="en-US" altLang="ko-KR" dirty="0" smtClean="0"/>
+              <a:t>)</a:t>
+            </a:r>
+          </a:p>
+          <a:p>
+            <a:pPr>
+              <a:buNone/>
+            </a:pPr>
+            <a:r>
+              <a:rPr lang="en-US" altLang="ko-KR" dirty="0" smtClean="0"/>
+              <a:t>		</a:t>
+            </a:r>
+            <a:r>
+              <a:rPr lang="en-US" altLang="ko-KR" dirty="0" err="1" smtClean="0"/>
+              <a:t>context.getSystemService</a:t>
+            </a:r>
+            <a:r>
+              <a:rPr lang="en-US" altLang="ko-KR" dirty="0" smtClean="0"/>
+              <a:t>(</a:t>
+            </a:r>
+          </a:p>
+          <a:p>
+            <a:pPr>
+              <a:buNone/>
+            </a:pPr>
+            <a:r>
+              <a:rPr lang="en-US" altLang="ko-KR" dirty="0"/>
+              <a:t>	</a:t>
+            </a:r>
+            <a:r>
+              <a:rPr lang="en-US" altLang="ko-KR" dirty="0" smtClean="0"/>
+              <a:t>		</a:t>
+            </a:r>
+            <a:r>
+              <a:rPr lang="en-US" altLang="ko-KR" dirty="0" err="1" smtClean="0"/>
+              <a:t>Context.DEVICE_POLICY_SERVICE</a:t>
+            </a:r>
+            <a:r>
+              <a:rPr lang="en-US" altLang="ko-KR" dirty="0" smtClean="0"/>
+              <a:t>) ;	</a:t>
+            </a:r>
+            <a:endParaRPr lang="en-US" altLang="ko-KR" dirty="0" smtClean="0"/>
+          </a:p>
+          <a:p>
+            <a:pPr>
+              <a:buNone/>
+            </a:pPr>
+            <a:endParaRPr lang="en-US" altLang="ko-KR" dirty="0"/>
+          </a:p>
+          <a:p>
+            <a:r>
+              <a:rPr lang="en-US" altLang="ko-KR" dirty="0" smtClean="0"/>
+              <a:t>_</a:t>
+            </a:r>
+            <a:r>
+              <a:rPr lang="en-US" altLang="ko-KR" dirty="0" err="1" smtClean="0"/>
+              <a:t>cn</a:t>
+            </a:r>
+            <a:r>
+              <a:rPr lang="en-US" altLang="ko-KR" dirty="0" smtClean="0"/>
+              <a:t> = new </a:t>
+            </a:r>
+            <a:r>
+              <a:rPr lang="en-US" altLang="ko-KR" dirty="0" err="1" smtClean="0"/>
+              <a:t>ComponentName</a:t>
+            </a:r>
+            <a:r>
+              <a:rPr lang="en-US" altLang="ko-KR" dirty="0" smtClean="0"/>
+              <a:t>( context, </a:t>
+            </a:r>
+            <a:r>
+              <a:rPr lang="en-US" altLang="ko-KR" dirty="0" err="1" smtClean="0"/>
+              <a:t>DeviceAdministrator.class</a:t>
+            </a:r>
+            <a:r>
+              <a:rPr lang="en-US" altLang="ko-KR" dirty="0" smtClean="0"/>
+              <a:t>) </a:t>
+            </a:r>
+            <a:r>
+              <a:rPr lang="en-US" altLang="ko-KR" dirty="0" smtClean="0"/>
+              <a:t>;</a:t>
+            </a:r>
+          </a:p>
+          <a:p>
+            <a:endParaRPr lang="en-US" altLang="ko-KR" dirty="0" smtClean="0"/>
+          </a:p>
+          <a:p>
+            <a:r>
+              <a:rPr lang="en-US" altLang="ko-KR" dirty="0" smtClean="0"/>
+              <a:t>if( _</a:t>
+            </a:r>
+            <a:r>
+              <a:rPr lang="en-US" altLang="ko-KR" dirty="0" err="1" smtClean="0"/>
+              <a:t>dpm</a:t>
+            </a:r>
+            <a:r>
+              <a:rPr lang="en-US" altLang="ko-KR" dirty="0" smtClean="0"/>
+              <a:t> != null &amp;&amp; !_</a:t>
+            </a:r>
+            <a:r>
+              <a:rPr lang="en-US" altLang="ko-KR" dirty="0" err="1" smtClean="0"/>
+              <a:t>dpm.isAdminActive</a:t>
+            </a:r>
+            <a:r>
+              <a:rPr lang="en-US" altLang="ko-KR" dirty="0" smtClean="0"/>
+              <a:t>( _</a:t>
+            </a:r>
+            <a:r>
+              <a:rPr lang="en-US" altLang="ko-KR" dirty="0" err="1" smtClean="0"/>
+              <a:t>cn</a:t>
+            </a:r>
+            <a:r>
+              <a:rPr lang="en-US" altLang="ko-KR" dirty="0" smtClean="0"/>
+              <a:t> ) ) {</a:t>
+            </a:r>
+          </a:p>
+          <a:p>
+            <a:pPr>
+              <a:buNone/>
+            </a:pPr>
+            <a:r>
+              <a:rPr lang="en-US" altLang="ko-KR" dirty="0"/>
+              <a:t>	</a:t>
+            </a:r>
+            <a:r>
+              <a:rPr lang="en-US" altLang="ko-KR" dirty="0" smtClean="0"/>
+              <a:t>	Intent </a:t>
+            </a:r>
+            <a:r>
+              <a:rPr lang="en-US" altLang="ko-KR" dirty="0" err="1" smtClean="0"/>
+              <a:t>i</a:t>
+            </a:r>
+            <a:r>
+              <a:rPr lang="en-US" altLang="ko-KR" dirty="0" smtClean="0"/>
+              <a:t> = new Intent( </a:t>
+            </a:r>
+            <a:r>
+              <a:rPr lang="en-US" altLang="ko-KR" dirty="0" err="1" smtClean="0"/>
+              <a:t>DevicePolicyManger</a:t>
+            </a:r>
+            <a:r>
+              <a:rPr lang="en-US" altLang="ko-KR" dirty="0" smtClean="0"/>
+              <a:t>.</a:t>
+            </a:r>
+          </a:p>
+          <a:p>
+            <a:pPr>
+              <a:buNone/>
+            </a:pPr>
+            <a:r>
+              <a:rPr lang="en-US" altLang="ko-KR" dirty="0"/>
+              <a:t>	</a:t>
+            </a:r>
+            <a:r>
+              <a:rPr lang="en-US" altLang="ko-KR" dirty="0" smtClean="0"/>
+              <a:t>		ACTION_ADD_DEVICE_ADMIN ) ;</a:t>
+            </a:r>
+          </a:p>
+          <a:p>
+            <a:pPr>
+              <a:buNone/>
+            </a:pPr>
+            <a:r>
+              <a:rPr lang="en-US" altLang="ko-KR" dirty="0" smtClean="0"/>
+              <a:t>		</a:t>
+            </a:r>
+            <a:r>
+              <a:rPr lang="en-US" altLang="ko-KR" dirty="0" err="1" smtClean="0"/>
+              <a:t>i.putExtra</a:t>
+            </a:r>
+            <a:r>
+              <a:rPr lang="en-US" altLang="ko-KR" dirty="0" smtClean="0"/>
+              <a:t>(</a:t>
+            </a:r>
+            <a:r>
+              <a:rPr lang="en-US" altLang="ko-KR" dirty="0" err="1" smtClean="0"/>
+              <a:t>DevicePolicyManager</a:t>
+            </a:r>
+            <a:r>
+              <a:rPr lang="en-US" altLang="ko-KR" dirty="0" smtClean="0"/>
+              <a:t>.</a:t>
+            </a:r>
+          </a:p>
+          <a:p>
+            <a:pPr>
+              <a:buNone/>
+            </a:pPr>
+            <a:r>
+              <a:rPr lang="en-US" altLang="ko-KR" dirty="0"/>
+              <a:t>	</a:t>
+            </a:r>
+            <a:r>
+              <a:rPr lang="en-US" altLang="ko-KR" dirty="0" smtClean="0"/>
+              <a:t>		EXTRA_DEVICE_ADMIN, _</a:t>
+            </a:r>
+            <a:r>
+              <a:rPr lang="en-US" altLang="ko-KR" dirty="0" err="1" smtClean="0"/>
+              <a:t>cn</a:t>
+            </a:r>
+            <a:r>
+              <a:rPr lang="en-US" altLang="ko-KR" dirty="0" smtClean="0"/>
+              <a:t> ) ;</a:t>
+            </a:r>
+          </a:p>
+          <a:p>
+            <a:pPr>
+              <a:buNone/>
+            </a:pPr>
+            <a:r>
+              <a:rPr lang="en-US" altLang="ko-KR" dirty="0"/>
+              <a:t>	</a:t>
+            </a:r>
+            <a:r>
+              <a:rPr lang="en-US" altLang="ko-KR" dirty="0" smtClean="0"/>
+              <a:t>	</a:t>
+            </a:r>
+            <a:r>
+              <a:rPr lang="en-US" altLang="ko-KR" dirty="0" err="1" smtClean="0"/>
+              <a:t>context.startActivity</a:t>
+            </a:r>
+            <a:r>
+              <a:rPr lang="en-US" altLang="ko-KR" dirty="0" smtClean="0"/>
+              <a:t>( </a:t>
+            </a:r>
+            <a:r>
+              <a:rPr lang="en-US" altLang="ko-KR" dirty="0" err="1" smtClean="0"/>
+              <a:t>i</a:t>
+            </a:r>
+            <a:r>
+              <a:rPr lang="en-US" altLang="ko-KR" dirty="0" smtClean="0"/>
+              <a:t> ) ;</a:t>
+            </a:r>
+          </a:p>
+          <a:p>
+            <a:pPr>
+              <a:buNone/>
+            </a:pPr>
+            <a:r>
+              <a:rPr lang="en-US" altLang="ko-KR" dirty="0"/>
+              <a:t>	</a:t>
+            </a:r>
+            <a:endParaRPr lang="en-US" altLang="ko-KR" dirty="0" smtClean="0"/>
+          </a:p>
+          <a:p>
+            <a:pPr>
+              <a:buNone/>
+            </a:pPr>
+            <a:r>
+              <a:rPr lang="en-US" altLang="ko-KR" dirty="0" smtClean="0"/>
+              <a:t>	*	*	*</a:t>
+            </a:r>
+          </a:p>
+          <a:p>
+            <a:endParaRPr lang="ko-KR" altLang="en-US" dirty="0"/>
+          </a:p>
+        </p:txBody>
+      </p:sp>
+    </p:spTree>
+  </p:cSld>
+  <p:clrMapOvr>
+    <a:masterClrMapping/>
+  </p:clrMapOvr>
+  <p:timing>
+    <p:tnLst>
+      <p:par>
+        <p:cTn id="1" dur="indefinite" restart="never" nodeType="tmRoot"/>
+      </p:par>
+    </p:tnLst>
+  </p:timing>
+</p:sld>
+</file>
+
+<file path=ppt/slides/slide9.xml><?xml version="1.0" encoding="utf-8"?>
+<p:sld xmlns:a="http://schemas.openxmlformats.org/drawingml/2006/main" xmlns:r="http://schemas.openxmlformats.org/officeDocument/2006/relationships" xmlns:p="http://schemas.openxmlformats.org/presentationml/2006/main">
+  <p:cSld>
+    <p:bg>
+      <p:bgPr>
+        <a:solidFill>
+          <a:schemeClr val="accent3"/>
+        </a:solidFill>
+        <a:effectLst/>
+      </p:bgPr>
+    </p:bg>
+    <p:spTree>
+      <p:nvGrpSpPr>
+        <p:cNvPr id="1" name=""/>
+        <p:cNvGrpSpPr/>
+        <p:nvPr/>
+      </p:nvGrpSpPr>
+      <p:grpSpPr>
+        <a:xfrm>
+          <a:off x="0" y="0"/>
+          <a:ext cx="0" cy="0"/>
+          <a:chOff x="0" y="0"/>
+          <a:chExt cx="0" cy="0"/>
+        </a:xfrm>
+      </p:grpSpPr>
+      <p:sp>
+        <p:nvSpPr>
+          <p:cNvPr id="2" name="제목 1"/>
+          <p:cNvSpPr>
+            <a:spLocks noGrp="1"/>
+          </p:cNvSpPr>
+          <p:nvPr>
+            <p:ph type="title"/>
+          </p:nvPr>
+        </p:nvSpPr>
+        <p:spPr/>
+        <p:txBody>
+          <a:bodyPr/>
+          <a:lstStyle/>
+          <a:p>
+            <a:r>
+              <a:rPr lang="en-US" altLang="ko-KR" dirty="0" err="1" smtClean="0"/>
+              <a:t>deactivateAdmin</a:t>
+            </a:r>
+            <a:r>
+              <a:rPr lang="en-US" altLang="ko-KR" dirty="0" smtClean="0"/>
+              <a:t>( )</a:t>
+            </a:r>
+            <a:endParaRPr lang="ko-KR" altLang="en-US" dirty="0"/>
+          </a:p>
+        </p:txBody>
+      </p:sp>
+      <p:sp>
+        <p:nvSpPr>
+          <p:cNvPr id="3" name="내용 개체 틀 2"/>
+          <p:cNvSpPr>
+            <a:spLocks noGrp="1"/>
+          </p:cNvSpPr>
+          <p:nvPr>
+            <p:ph idx="1"/>
+          </p:nvPr>
+        </p:nvSpPr>
+        <p:spPr/>
+        <p:txBody>
+          <a:bodyPr/>
+          <a:lstStyle/>
+          <a:p>
+            <a:endParaRPr lang="ko-KR" altLang="en-US" dirty="0"/>
+          </a:p>
+        </p:txBody>
+      </p:sp>
+    </p:spTree>
+  </p:cSld>
+  <p:clrMapOvr>
+    <a:masterClrMapping/>
+  </p:clrMapOvr>
+  <p:timing>
+    <p:tnLst>
+      <p:par>
+        <p:cTn id="1" dur="indefinite" restart="never" nodeType="tmRoot"/>
+      </p:par>
+    </p:tnLst>
+  </p:timing>
 </p:sld>
 </file>
 

</xml_diff>